<commit_message>
Updated one of the slides, and the Death_V_Race code
</commit_message>
<xml_diff>
--- a/Prescription Pain Pills.pptx
+++ b/Prescription Pain Pills.pptx
@@ -5,10 +5,10 @@
     <p:sldMasterId id="2147483648" r:id="rId1"/>
   </p:sldMasterIdLst>
   <p:notesMasterIdLst>
-    <p:notesMasterId r:id="rId13"/>
+    <p:notesMasterId r:id="rId12"/>
   </p:notesMasterIdLst>
   <p:handoutMasterIdLst>
-    <p:handoutMasterId r:id="rId14"/>
+    <p:handoutMasterId r:id="rId13"/>
   </p:handoutMasterIdLst>
   <p:sldIdLst>
     <p:sldId id="256" r:id="rId2"/>
@@ -21,7 +21,6 @@
     <p:sldId id="279" r:id="rId9"/>
     <p:sldId id="269" r:id="rId10"/>
     <p:sldId id="270" r:id="rId11"/>
-    <p:sldId id="275" r:id="rId12"/>
   </p:sldIdLst>
   <p:sldSz cx="9144000" cy="6858000" type="screen4x3"/>
   <p:notesSz cx="6858000" cy="9144000"/>
@@ -121,6 +120,28 @@
     </a:lvl9pPr>
   </p:defaultTextStyle>
   <p:extLst>
+    <p:ext uri="{521415D9-36F7-43E2-AB2F-B90AF26B5E84}">
+      <p14:sectionLst xmlns:p14="http://schemas.microsoft.com/office/powerpoint/2010/main">
+        <p14:section name="Default Section" id="{9A8E5557-B902-4A2D-AEC0-172B94CF108F}">
+          <p14:sldIdLst>
+            <p14:sldId id="256"/>
+            <p14:sldId id="265"/>
+            <p14:sldId id="280"/>
+            <p14:sldId id="276"/>
+            <p14:sldId id="267"/>
+            <p14:sldId id="277"/>
+          </p14:sldIdLst>
+        </p14:section>
+        <p14:section name="Untitled Section" id="{CD2DCD51-F58F-4A5E-B54F-C671E0A73CA7}">
+          <p14:sldIdLst>
+            <p14:sldId id="278"/>
+            <p14:sldId id="279"/>
+            <p14:sldId id="269"/>
+            <p14:sldId id="270"/>
+          </p14:sldIdLst>
+        </p14:section>
+      </p14:sectionLst>
+    </p:ext>
     <p:ext uri="{EFAFB233-063F-42B5-8137-9DF3F51BA10A}">
       <p15:sldGuideLst xmlns:p15="http://schemas.microsoft.com/office/powerpoint/2012/main">
         <p15:guide id="1" pos="2880" userDrawn="1">
@@ -140,6 +161,32 @@
     </p:ext>
   </p:extLst>
 </p:presentation>
+</file>
+
+<file path=ppt/commentAuthors.xml><?xml version="1.0" encoding="utf-8"?>
+<p:cmAuthorLst xmlns:a="http://schemas.openxmlformats.org/drawingml/2006/main" xmlns:r="http://schemas.openxmlformats.org/officeDocument/2006/relationships" xmlns:p="http://schemas.openxmlformats.org/presentationml/2006/main">
+  <p:cmAuthor id="1" name="Steven Quitugua" initials="SQ" lastIdx="1" clrIdx="0">
+    <p:extLst>
+      <p:ext uri="{19B8F6BF-5375-455C-9EA6-DF929625EA0E}">
+        <p15:presenceInfo xmlns:p15="http://schemas.microsoft.com/office/powerpoint/2012/main" userId="57f2e9da55c33455" providerId="Windows Live"/>
+      </p:ext>
+    </p:extLst>
+  </p:cmAuthor>
+</p:cmAuthorLst>
+</file>
+
+<file path=ppt/comments/comment1.xml><?xml version="1.0" encoding="utf-8"?>
+<p:cmLst xmlns:a="http://schemas.openxmlformats.org/drawingml/2006/main" xmlns:r="http://schemas.openxmlformats.org/officeDocument/2006/relationships" xmlns:p="http://schemas.openxmlformats.org/presentationml/2006/main">
+  <p:cm authorId="1" dt="2020-01-10T21:46:57.451" idx="1">
+    <p:pos x="10" y="10"/>
+    <p:text/>
+    <p:extLst>
+      <p:ext uri="{C676402C-5697-4E1C-873F-D02D1690AC5C}">
+        <p15:threadingInfo xmlns:p15="http://schemas.microsoft.com/office/powerpoint/2012/main" timeZoneBias="480"/>
+      </p:ext>
+    </p:extLst>
+  </p:cm>
+</p:cmLst>
 </file>
 
 <file path=ppt/diagrams/colors1.xml><?xml version="1.0" encoding="utf-8"?>
@@ -5320,7 +5367,7 @@
           <a:p>
             <a:fld id="{762B48F5-BACC-47D6-A0F7-82FBF9C6BC85}" type="datetimeFigureOut">
               <a:rPr lang="en-US"/>
-              <a:t>1/8/2020</a:t>
+              <a:t>1/10/2020</a:t>
             </a:fld>
             <a:endParaRPr/>
           </a:p>
@@ -5485,7 +5532,7 @@
           <a:p>
             <a:fld id="{0CB1CD00-5424-4675-AB18-2C419B060449}" type="datetimeFigureOut">
               <a:rPr lang="en-US"/>
-              <a:t>1/8/2020</a:t>
+              <a:t>1/10/2020</a:t>
             </a:fld>
             <a:endParaRPr/>
           </a:p>
@@ -6130,7 +6177,7 @@
           <a:p>
             <a:fld id="{37CC0096-1860-4642-9CD2-0079EA5E7CD1}" type="datetimeFigureOut">
               <a:rPr lang="en-US" smtClean="0"/>
-              <a:t>1/8/2020</a:t>
+              <a:t>1/10/2020</a:t>
             </a:fld>
             <a:endParaRPr lang="en-US"/>
           </a:p>
@@ -6309,7 +6356,7 @@
           <a:p>
             <a:fld id="{37CC0096-1860-4642-9CD2-0079EA5E7CD1}" type="datetimeFigureOut">
               <a:rPr lang="en-US" smtClean="0"/>
-              <a:t>1/8/2020</a:t>
+              <a:t>1/10/2020</a:t>
             </a:fld>
             <a:endParaRPr lang="en-US"/>
           </a:p>
@@ -6482,7 +6529,7 @@
           <a:p>
             <a:fld id="{37CC0096-1860-4642-9CD2-0079EA5E7CD1}" type="datetimeFigureOut">
               <a:rPr lang="en-US" smtClean="0"/>
-              <a:t>1/8/2020</a:t>
+              <a:t>1/10/2020</a:t>
             </a:fld>
             <a:endParaRPr lang="en-US"/>
           </a:p>
@@ -6915,7 +6962,7 @@
           <a:p>
             <a:fld id="{37CC0096-1860-4642-9CD2-0079EA5E7CD1}" type="datetimeFigureOut">
               <a:rPr lang="en-US" smtClean="0"/>
-              <a:t>1/8/2020</a:t>
+              <a:t>1/10/2020</a:t>
             </a:fld>
             <a:endParaRPr lang="en-US"/>
           </a:p>
@@ -7354,7 +7401,7 @@
           <a:p>
             <a:fld id="{37CC0096-1860-4642-9CD2-0079EA5E7CD1}" type="datetimeFigureOut">
               <a:rPr lang="en-US" smtClean="0"/>
-              <a:t>1/8/2020</a:t>
+              <a:t>1/10/2020</a:t>
             </a:fld>
             <a:endParaRPr lang="en-US"/>
           </a:p>
@@ -7471,7 +7518,7 @@
           <a:p>
             <a:fld id="{37CC0096-1860-4642-9CD2-0079EA5E7CD1}" type="datetimeFigureOut">
               <a:rPr lang="en-US" smtClean="0"/>
-              <a:t>1/8/2020</a:t>
+              <a:t>1/10/2020</a:t>
             </a:fld>
             <a:endParaRPr lang="en-US"/>
           </a:p>
@@ -7566,7 +7613,7 @@
           <a:p>
             <a:fld id="{37CC0096-1860-4642-9CD2-0079EA5E7CD1}" type="datetimeFigureOut">
               <a:rPr lang="en-US" smtClean="0"/>
-              <a:t>1/8/2020</a:t>
+              <a:t>1/10/2020</a:t>
             </a:fld>
             <a:endParaRPr lang="en-US"/>
           </a:p>
@@ -7850,7 +7897,7 @@
           <a:p>
             <a:fld id="{37CC0096-1860-4642-9CD2-0079EA5E7CD1}" type="datetimeFigureOut">
               <a:rPr lang="en-US" smtClean="0"/>
-              <a:t>1/8/2020</a:t>
+              <a:t>1/10/2020</a:t>
             </a:fld>
             <a:endParaRPr lang="en-US"/>
           </a:p>
@@ -8161,7 +8208,7 @@
           <a:p>
             <a:fld id="{37CC0096-1860-4642-9CD2-0079EA5E7CD1}" type="datetimeFigureOut">
               <a:rPr lang="en-US" smtClean="0"/>
-              <a:t>1/8/2020</a:t>
+              <a:t>1/10/2020</a:t>
             </a:fld>
             <a:endParaRPr lang="en-US"/>
           </a:p>
@@ -8393,7 +8440,7 @@
             <a:fld id="{37CC0096-1860-4642-9CD2-0079EA5E7CD1}" type="datetimeFigureOut">
               <a:rPr lang="en-US" smtClean="0"/>
               <a:pPr/>
-              <a:t>1/8/2020</a:t>
+              <a:t>1/10/2020</a:t>
             </a:fld>
             <a:endParaRPr lang="en-US"/>
           </a:p>
@@ -8964,90 +9011,6 @@
 </p:sld>
 </file>
 
-<file path=ppt/slides/slide11.xml><?xml version="1.0" encoding="utf-8"?>
-<p:sld xmlns:a="http://schemas.openxmlformats.org/drawingml/2006/main" xmlns:r="http://schemas.openxmlformats.org/officeDocument/2006/relationships" xmlns:p="http://schemas.openxmlformats.org/presentationml/2006/main">
-  <p:cSld>
-    <p:spTree>
-      <p:nvGrpSpPr>
-        <p:cNvPr id="1" name=""/>
-        <p:cNvGrpSpPr/>
-        <p:nvPr/>
-      </p:nvGrpSpPr>
-      <p:grpSpPr>
-        <a:xfrm>
-          <a:off x="0" y="0"/>
-          <a:ext cx="0" cy="0"/>
-          <a:chOff x="0" y="0"/>
-          <a:chExt cx="0" cy="0"/>
-        </a:xfrm>
-      </p:grpSpPr>
-      <p:sp>
-        <p:nvSpPr>
-          <p:cNvPr id="2" name="Title 1"/>
-          <p:cNvSpPr>
-            <a:spLocks noGrp="1"/>
-          </p:cNvSpPr>
-          <p:nvPr>
-            <p:ph type="title"/>
-          </p:nvPr>
-        </p:nvSpPr>
-        <p:spPr/>
-        <p:txBody>
-          <a:bodyPr/>
-          <a:lstStyle/>
-          <a:p>
-            <a:r>
-              <a:rPr lang="en-US" dirty="0"/>
-              <a:t>Add a Slide Title - 5</a:t>
-            </a:r>
-            <a:endParaRPr dirty="0"/>
-          </a:p>
-        </p:txBody>
-      </p:sp>
-      <p:sp>
-        <p:nvSpPr>
-          <p:cNvPr id="3" name="Picture Placeholder 2" descr="An empty placeholder to add an image. Click on the placeholder and select the image that you wish to add."/>
-          <p:cNvSpPr>
-            <a:spLocks noGrp="1"/>
-          </p:cNvSpPr>
-          <p:nvPr>
-            <p:ph type="pic" idx="1"/>
-          </p:nvPr>
-        </p:nvSpPr>
-        <p:spPr/>
-      </p:sp>
-      <p:sp>
-        <p:nvSpPr>
-          <p:cNvPr id="4" name="Text Placeholder 3"/>
-          <p:cNvSpPr>
-            <a:spLocks noGrp="1"/>
-          </p:cNvSpPr>
-          <p:nvPr>
-            <p:ph type="body" sz="half" idx="2"/>
-          </p:nvPr>
-        </p:nvSpPr>
-        <p:spPr/>
-        <p:txBody>
-          <a:bodyPr/>
-          <a:lstStyle/>
-          <a:p>
-            <a:endParaRPr/>
-          </a:p>
-        </p:txBody>
-      </p:sp>
-    </p:spTree>
-    <p:extLst>
-      <p:ext uri="{BB962C8B-B14F-4D97-AF65-F5344CB8AC3E}">
-        <p14:creationId xmlns:p14="http://schemas.microsoft.com/office/powerpoint/2010/main" val="1857640680"/>
-      </p:ext>
-    </p:extLst>
-  </p:cSld>
-  <p:clrMapOvr>
-    <a:masterClrMapping/>
-  </p:clrMapOvr>
-</p:sld>
-</file>
-
 <file path=ppt/slides/slide2.xml><?xml version="1.0" encoding="utf-8"?>
 <p:sld xmlns:a="http://schemas.openxmlformats.org/drawingml/2006/main" xmlns:r="http://schemas.openxmlformats.org/officeDocument/2006/relationships" xmlns:p="http://schemas.openxmlformats.org/presentationml/2006/main">
   <p:cSld>
@@ -9255,6 +9218,12 @@
               <a:rPr lang="en-US" dirty="0"/>
               <a:t>If death rates and race are related, then black communities will have a higher death rate than white communities.</a:t>
             </a:r>
+          </a:p>
+          <a:p>
+            <a:pPr marL="0" indent="0">
+              <a:buNone/>
+            </a:pPr>
+            <a:endParaRPr lang="en-US" dirty="0"/>
           </a:p>
         </p:txBody>
       </p:sp>
@@ -9690,10 +9659,7 @@
           <a:bodyPr/>
           <a:lstStyle/>
           <a:p>
-            <a:r>
-              <a:rPr lang="en-US" dirty="0"/>
-              <a:t>Top Ten Cities with the most pills</a:t>
-            </a:r>
+            <a:endParaRPr lang="en-US" dirty="0"/>
           </a:p>
         </p:txBody>
       </p:sp>
@@ -9785,60 +9751,162 @@
           <a:p>
             <a:r>
               <a:rPr lang="en-US" dirty="0"/>
-              <a:t>Top Ten Cities with the Highest Death Rate</a:t>
+              <a:t>Race Versus Death Rates</a:t>
             </a:r>
           </a:p>
         </p:txBody>
       </p:sp>
       <p:pic>
         <p:nvPicPr>
-          <p:cNvPr id="1026" name="Picture 2">
+          <p:cNvPr id="7" name="Content Placeholder 6">
             <a:extLst>
               <a:ext uri="{FF2B5EF4-FFF2-40B4-BE49-F238E27FC236}">
-                <a16:creationId xmlns:a16="http://schemas.microsoft.com/office/drawing/2014/main" id="{2ECBDCC1-9F61-43D7-B096-882AD49C4CC9}"/>
+                <a16:creationId xmlns:a16="http://schemas.microsoft.com/office/drawing/2014/main" id="{3DE9820C-37E3-407F-8499-F8F26D75406E}"/>
               </a:ext>
             </a:extLst>
           </p:cNvPr>
           <p:cNvPicPr>
-            <a:picLocks noGrp="1" noChangeAspect="1" noChangeArrowheads="1"/>
+            <a:picLocks noGrp="1" noChangeAspect="1"/>
           </p:cNvPicPr>
           <p:nvPr>
             <p:ph idx="1"/>
           </p:nvPr>
         </p:nvPicPr>
         <p:blipFill>
-          <a:blip r:embed="rId2">
-            <a:extLst>
-              <a:ext uri="{28A0092B-C50C-407E-A947-70E740481C1C}">
-                <a14:useLocalDpi xmlns:a14="http://schemas.microsoft.com/office/drawing/2010/main" val="0"/>
-              </a:ext>
-            </a:extLst>
-          </a:blip>
-          <a:srcRect/>
+          <a:blip r:embed="rId2"/>
           <a:stretch>
             <a:fillRect/>
           </a:stretch>
         </p:blipFill>
-        <p:spPr bwMode="auto">
+        <p:spPr>
           <a:xfrm>
-            <a:off x="8389" y="2590800"/>
-            <a:ext cx="9135611" cy="4267200"/>
+            <a:off x="-47698" y="2714624"/>
+            <a:ext cx="6610423" cy="4143375"/>
+          </a:xfrm>
+          <a:prstGeom prst="rect">
+            <a:avLst/>
+          </a:prstGeom>
+        </p:spPr>
+      </p:pic>
+      <p:pic>
+        <p:nvPicPr>
+          <p:cNvPr id="8" name="Picture 7">
+            <a:extLst>
+              <a:ext uri="{FF2B5EF4-FFF2-40B4-BE49-F238E27FC236}">
+                <a16:creationId xmlns:a16="http://schemas.microsoft.com/office/drawing/2014/main" id="{5A5DD584-6CEE-4184-8F14-058FF59806EB}"/>
+              </a:ext>
+            </a:extLst>
+          </p:cNvPr>
+          <p:cNvPicPr>
+            <a:picLocks noChangeAspect="1"/>
+          </p:cNvPicPr>
+          <p:nvPr/>
+        </p:nvPicPr>
+        <p:blipFill>
+          <a:blip r:embed="rId3"/>
+          <a:stretch>
+            <a:fillRect/>
+          </a:stretch>
+        </p:blipFill>
+        <p:spPr>
+          <a:xfrm>
+            <a:off x="6692492" y="4419599"/>
+            <a:ext cx="2419350" cy="2438400"/>
+          </a:xfrm>
+          <a:prstGeom prst="rect">
+            <a:avLst/>
+          </a:prstGeom>
+        </p:spPr>
+      </p:pic>
+      <p:sp>
+        <p:nvSpPr>
+          <p:cNvPr id="9" name="TextBox 8">
+            <a:extLst>
+              <a:ext uri="{FF2B5EF4-FFF2-40B4-BE49-F238E27FC236}">
+                <a16:creationId xmlns:a16="http://schemas.microsoft.com/office/drawing/2014/main" id="{73794508-4138-4CF9-BDB0-26DDC78C1F9A}"/>
+              </a:ext>
+            </a:extLst>
+          </p:cNvPr>
+          <p:cNvSpPr txBox="1"/>
+          <p:nvPr/>
+        </p:nvSpPr>
+        <p:spPr>
+          <a:xfrm>
+            <a:off x="457200" y="1905000"/>
+            <a:ext cx="5001690" cy="461665"/>
           </a:xfrm>
           <a:prstGeom prst="rect">
             <a:avLst/>
           </a:prstGeom>
           <a:noFill/>
-          <a:extLst>
-            <a:ext uri="{909E8E84-426E-40DD-AFC4-6F175D3DCCD1}">
-              <a14:hiddenFill xmlns:a14="http://schemas.microsoft.com/office/drawing/2010/main">
+        </p:spPr>
+        <p:txBody>
+          <a:bodyPr wrap="none" rtlCol="0">
+            <a:spAutoFit/>
+          </a:bodyPr>
+          <a:lstStyle/>
+          <a:p>
+            <a:pPr marL="171450" indent="-171450">
+              <a:buFont typeface="Arial" panose="020B0604020202020204" pitchFamily="34" charset="0"/>
+              <a:buChar char="•"/>
+            </a:pPr>
+            <a:r>
+              <a:rPr lang="en-US" sz="1200" dirty="0">
                 <a:solidFill>
-                  <a:srgbClr val="FFFFFF"/>
+                  <a:srgbClr val="FF0000"/>
                 </a:solidFill>
-              </a14:hiddenFill>
-            </a:ext>
-          </a:extLst>
-        </p:spPr>
-      </p:pic>
+              </a:rPr>
+              <a:t>1</a:t>
+            </a:r>
+            <a:r>
+              <a:rPr lang="en-US" sz="1200" baseline="30000" dirty="0">
+                <a:solidFill>
+                  <a:srgbClr val="FF0000"/>
+                </a:solidFill>
+              </a:rPr>
+              <a:t>st</a:t>
+            </a:r>
+            <a:r>
+              <a:rPr lang="en-US" sz="1200" dirty="0">
+                <a:solidFill>
+                  <a:srgbClr val="FF0000"/>
+                </a:solidFill>
+              </a:rPr>
+              <a:t> quartile and minimum was not displayed because median was zero</a:t>
+            </a:r>
+          </a:p>
+          <a:p>
+            <a:pPr marL="171450" indent="-171450">
+              <a:buFont typeface="Arial" panose="020B0604020202020204" pitchFamily="34" charset="0"/>
+              <a:buChar char="•"/>
+            </a:pPr>
+            <a:r>
+              <a:rPr lang="en-US" sz="1200" dirty="0">
+                <a:solidFill>
+                  <a:srgbClr val="FF0000"/>
+                </a:solidFill>
+              </a:rPr>
+              <a:t>4</a:t>
+            </a:r>
+            <a:r>
+              <a:rPr lang="en-US" sz="1200" baseline="30000" dirty="0">
+                <a:solidFill>
+                  <a:srgbClr val="FF0000"/>
+                </a:solidFill>
+              </a:rPr>
+              <a:t>th</a:t>
+            </a:r>
+            <a:r>
+              <a:rPr lang="en-US" sz="1200" dirty="0">
+                <a:solidFill>
+                  <a:srgbClr val="FF0000"/>
+                </a:solidFill>
+              </a:rPr>
+              <a:t> quartile to maximum for the white community had a 98.87% increase</a:t>
+            </a:r>
+          </a:p>
+        </p:txBody>
+      </p:sp>
     </p:spTree>
     <p:extLst>
       <p:ext uri="{BB962C8B-B14F-4D97-AF65-F5344CB8AC3E}">

</xml_diff>

<commit_message>
add number of deaths vs pill rates
</commit_message>
<xml_diff>
--- a/Prescription Pain Pills.pptx
+++ b/Prescription Pain Pills.pptx
@@ -5,10 +5,10 @@
     <p:sldMasterId id="2147483648" r:id="rId1"/>
   </p:sldMasterIdLst>
   <p:notesMasterIdLst>
-    <p:notesMasterId r:id="rId12"/>
+    <p:notesMasterId r:id="rId13"/>
   </p:notesMasterIdLst>
   <p:handoutMasterIdLst>
-    <p:handoutMasterId r:id="rId13"/>
+    <p:handoutMasterId r:id="rId14"/>
   </p:handoutMasterIdLst>
   <p:sldIdLst>
     <p:sldId id="256" r:id="rId2"/>
@@ -20,7 +20,8 @@
     <p:sldId id="278" r:id="rId8"/>
     <p:sldId id="279" r:id="rId9"/>
     <p:sldId id="269" r:id="rId10"/>
-    <p:sldId id="270" r:id="rId11"/>
+    <p:sldId id="281" r:id="rId11"/>
+    <p:sldId id="270" r:id="rId12"/>
   </p:sldIdLst>
   <p:sldSz cx="9144000" cy="6858000" type="screen4x3"/>
   <p:notesSz cx="6858000" cy="9144000"/>
@@ -137,6 +138,7 @@
             <p14:sldId id="278"/>
             <p14:sldId id="279"/>
             <p14:sldId id="269"/>
+            <p14:sldId id="281"/>
             <p14:sldId id="270"/>
           </p14:sldIdLst>
         </p14:section>
@@ -257,7 +259,7 @@
           <a:p>
             <a:fld id="{762B48F5-BACC-47D6-A0F7-82FBF9C6BC85}" type="datetimeFigureOut">
               <a:rPr lang="en-US"/>
-              <a:t>1/10/2020</a:t>
+              <a:t>1/10/20</a:t>
             </a:fld>
             <a:endParaRPr/>
           </a:p>
@@ -422,7 +424,7 @@
           <a:p>
             <a:fld id="{0CB1CD00-5424-4675-AB18-2C419B060449}" type="datetimeFigureOut">
               <a:rPr lang="en-US"/>
-              <a:t>1/10/2020</a:t>
+              <a:t>1/10/20</a:t>
             </a:fld>
             <a:endParaRPr/>
           </a:p>
@@ -1067,7 +1069,7 @@
           <a:p>
             <a:fld id="{37CC0096-1860-4642-9CD2-0079EA5E7CD1}" type="datetimeFigureOut">
               <a:rPr lang="en-US" smtClean="0"/>
-              <a:t>1/10/2020</a:t>
+              <a:t>1/10/20</a:t>
             </a:fld>
             <a:endParaRPr lang="en-US"/>
           </a:p>
@@ -1246,7 +1248,7 @@
           <a:p>
             <a:fld id="{37CC0096-1860-4642-9CD2-0079EA5E7CD1}" type="datetimeFigureOut">
               <a:rPr lang="en-US" smtClean="0"/>
-              <a:t>1/10/2020</a:t>
+              <a:t>1/10/20</a:t>
             </a:fld>
             <a:endParaRPr lang="en-US"/>
           </a:p>
@@ -1419,7 +1421,7 @@
           <a:p>
             <a:fld id="{37CC0096-1860-4642-9CD2-0079EA5E7CD1}" type="datetimeFigureOut">
               <a:rPr lang="en-US" smtClean="0"/>
-              <a:t>1/10/2020</a:t>
+              <a:t>1/10/20</a:t>
             </a:fld>
             <a:endParaRPr lang="en-US"/>
           </a:p>
@@ -1852,7 +1854,7 @@
           <a:p>
             <a:fld id="{37CC0096-1860-4642-9CD2-0079EA5E7CD1}" type="datetimeFigureOut">
               <a:rPr lang="en-US" smtClean="0"/>
-              <a:t>1/10/2020</a:t>
+              <a:t>1/10/20</a:t>
             </a:fld>
             <a:endParaRPr lang="en-US"/>
           </a:p>
@@ -2291,7 +2293,7 @@
           <a:p>
             <a:fld id="{37CC0096-1860-4642-9CD2-0079EA5E7CD1}" type="datetimeFigureOut">
               <a:rPr lang="en-US" smtClean="0"/>
-              <a:t>1/10/2020</a:t>
+              <a:t>1/10/20</a:t>
             </a:fld>
             <a:endParaRPr lang="en-US"/>
           </a:p>
@@ -2408,7 +2410,7 @@
           <a:p>
             <a:fld id="{37CC0096-1860-4642-9CD2-0079EA5E7CD1}" type="datetimeFigureOut">
               <a:rPr lang="en-US" smtClean="0"/>
-              <a:t>1/10/2020</a:t>
+              <a:t>1/10/20</a:t>
             </a:fld>
             <a:endParaRPr lang="en-US"/>
           </a:p>
@@ -2503,7 +2505,7 @@
           <a:p>
             <a:fld id="{37CC0096-1860-4642-9CD2-0079EA5E7CD1}" type="datetimeFigureOut">
               <a:rPr lang="en-US" smtClean="0"/>
-              <a:t>1/10/2020</a:t>
+              <a:t>1/10/20</a:t>
             </a:fld>
             <a:endParaRPr lang="en-US"/>
           </a:p>
@@ -2787,7 +2789,7 @@
           <a:p>
             <a:fld id="{37CC0096-1860-4642-9CD2-0079EA5E7CD1}" type="datetimeFigureOut">
               <a:rPr lang="en-US" smtClean="0"/>
-              <a:t>1/10/2020</a:t>
+              <a:t>1/10/20</a:t>
             </a:fld>
             <a:endParaRPr lang="en-US"/>
           </a:p>
@@ -3098,7 +3100,7 @@
           <a:p>
             <a:fld id="{37CC0096-1860-4642-9CD2-0079EA5E7CD1}" type="datetimeFigureOut">
               <a:rPr lang="en-US" smtClean="0"/>
-              <a:t>1/10/2020</a:t>
+              <a:t>1/10/20</a:t>
             </a:fld>
             <a:endParaRPr lang="en-US"/>
           </a:p>
@@ -3330,7 +3332,7 @@
             <a:fld id="{37CC0096-1860-4642-9CD2-0079EA5E7CD1}" type="datetimeFigureOut">
               <a:rPr lang="en-US" smtClean="0"/>
               <a:pPr/>
-              <a:t>1/10/2020</a:t>
+              <a:t>1/10/20</a:t>
             </a:fld>
             <a:endParaRPr lang="en-US"/>
           </a:p>
@@ -3830,6 +3832,104 @@
 </file>
 
 <file path=ppt/slides/slide10.xml><?xml version="1.0" encoding="utf-8"?>
+<p:sld xmlns:a="http://schemas.openxmlformats.org/drawingml/2006/main" xmlns:r="http://schemas.openxmlformats.org/officeDocument/2006/relationships" xmlns:p="http://schemas.openxmlformats.org/presentationml/2006/main">
+  <p:cSld>
+    <p:spTree>
+      <p:nvGrpSpPr>
+        <p:cNvPr id="1" name=""/>
+        <p:cNvGrpSpPr/>
+        <p:nvPr/>
+      </p:nvGrpSpPr>
+      <p:grpSpPr>
+        <a:xfrm>
+          <a:off x="0" y="0"/>
+          <a:ext cx="0" cy="0"/>
+          <a:chOff x="0" y="0"/>
+          <a:chExt cx="0" cy="0"/>
+        </a:xfrm>
+      </p:grpSpPr>
+      <p:sp>
+        <p:nvSpPr>
+          <p:cNvPr id="2" name="Title 1">
+            <a:extLst>
+              <a:ext uri="{FF2B5EF4-FFF2-40B4-BE49-F238E27FC236}">
+                <a16:creationId xmlns:a16="http://schemas.microsoft.com/office/drawing/2014/main" id="{94D01112-B3B2-4732-B1EF-EB012F44AF10}"/>
+              </a:ext>
+            </a:extLst>
+          </p:cNvPr>
+          <p:cNvSpPr>
+            <a:spLocks noGrp="1"/>
+          </p:cNvSpPr>
+          <p:nvPr>
+            <p:ph type="title"/>
+          </p:nvPr>
+        </p:nvSpPr>
+        <p:spPr>
+          <a:xfrm>
+            <a:off x="1143000" y="304800"/>
+            <a:ext cx="6858000" cy="533400"/>
+          </a:xfrm>
+        </p:spPr>
+        <p:txBody>
+          <a:bodyPr/>
+          <a:lstStyle/>
+          <a:p>
+            <a:r>
+              <a:rPr lang="en-US" dirty="0"/>
+              <a:t>Deaths vs Pills per Person</a:t>
+            </a:r>
+          </a:p>
+        </p:txBody>
+      </p:sp>
+      <p:pic>
+        <p:nvPicPr>
+          <p:cNvPr id="5" name="Content Placeholder 4" descr="A close up of a map&#10;&#10;Description automatically generated">
+            <a:extLst>
+              <a:ext uri="{FF2B5EF4-FFF2-40B4-BE49-F238E27FC236}">
+                <a16:creationId xmlns:a16="http://schemas.microsoft.com/office/drawing/2014/main" id="{CBCB6F4F-CCB1-7B4E-8AD0-B75DC0FC7E41}"/>
+              </a:ext>
+            </a:extLst>
+          </p:cNvPr>
+          <p:cNvPicPr>
+            <a:picLocks noGrp="1" noChangeAspect="1"/>
+          </p:cNvPicPr>
+          <p:nvPr>
+            <p:ph idx="1"/>
+          </p:nvPr>
+        </p:nvPicPr>
+        <p:blipFill>
+          <a:blip r:embed="rId2">
+            <a:extLst>
+              <a:ext uri="{28A0092B-C50C-407E-A947-70E740481C1C}">
+                <a14:useLocalDpi xmlns:a14="http://schemas.microsoft.com/office/drawing/2010/main" val="0"/>
+              </a:ext>
+            </a:extLst>
+          </a:blip>
+          <a:stretch>
+            <a:fillRect/>
+          </a:stretch>
+        </p:blipFill>
+        <p:spPr>
+          <a:xfrm>
+            <a:off x="114300" y="1203960"/>
+            <a:ext cx="8915400" cy="5349240"/>
+          </a:xfrm>
+        </p:spPr>
+      </p:pic>
+    </p:spTree>
+    <p:extLst>
+      <p:ext uri="{BB962C8B-B14F-4D97-AF65-F5344CB8AC3E}">
+        <p14:creationId xmlns:p14="http://schemas.microsoft.com/office/powerpoint/2010/main" val="712240131"/>
+      </p:ext>
+    </p:extLst>
+  </p:cSld>
+  <p:clrMapOvr>
+    <a:masterClrMapping/>
+  </p:clrMapOvr>
+</p:sld>
+</file>
+
+<file path=ppt/slides/slide11.xml><?xml version="1.0" encoding="utf-8"?>
 <p:sld xmlns:a="http://schemas.openxmlformats.org/drawingml/2006/main" xmlns:r="http://schemas.openxmlformats.org/officeDocument/2006/relationships" xmlns:p="http://schemas.openxmlformats.org/presentationml/2006/main">
   <p:cSld>
     <p:spTree>

</xml_diff>

<commit_message>
add final plots to presentation ppt
</commit_message>
<xml_diff>
--- a/Prescription Pain Pills.pptx
+++ b/Prescription Pain Pills.pptx
@@ -5,10 +5,10 @@
     <p:sldMasterId id="2147483648" r:id="rId1"/>
   </p:sldMasterIdLst>
   <p:notesMasterIdLst>
-    <p:notesMasterId r:id="rId13"/>
+    <p:notesMasterId r:id="rId14"/>
   </p:notesMasterIdLst>
   <p:handoutMasterIdLst>
-    <p:handoutMasterId r:id="rId14"/>
+    <p:handoutMasterId r:id="rId15"/>
   </p:handoutMasterIdLst>
   <p:sldIdLst>
     <p:sldId id="256" r:id="rId2"/>
@@ -16,12 +16,13 @@
     <p:sldId id="280" r:id="rId4"/>
     <p:sldId id="276" r:id="rId5"/>
     <p:sldId id="267" r:id="rId6"/>
-    <p:sldId id="277" r:id="rId7"/>
-    <p:sldId id="278" r:id="rId8"/>
-    <p:sldId id="279" r:id="rId9"/>
+    <p:sldId id="279" r:id="rId7"/>
+    <p:sldId id="283" r:id="rId8"/>
+    <p:sldId id="278" r:id="rId9"/>
     <p:sldId id="269" r:id="rId10"/>
     <p:sldId id="281" r:id="rId11"/>
-    <p:sldId id="270" r:id="rId12"/>
+    <p:sldId id="282" r:id="rId12"/>
+    <p:sldId id="270" r:id="rId13"/>
   </p:sldIdLst>
   <p:sldSz cx="9144000" cy="6858000" type="screen4x3"/>
   <p:notesSz cx="6858000" cy="9144000"/>
@@ -130,15 +131,16 @@
             <p14:sldId id="280"/>
             <p14:sldId id="276"/>
             <p14:sldId id="267"/>
-            <p14:sldId id="277"/>
           </p14:sldIdLst>
         </p14:section>
         <p14:section name="Untitled Section" id="{CD2DCD51-F58F-4A5E-B54F-C671E0A73CA7}">
           <p14:sldIdLst>
+            <p14:sldId id="279"/>
+            <p14:sldId id="283"/>
             <p14:sldId id="278"/>
-            <p14:sldId id="279"/>
             <p14:sldId id="269"/>
             <p14:sldId id="281"/>
+            <p14:sldId id="282"/>
             <p14:sldId id="270"/>
           </p14:sldIdLst>
         </p14:section>
@@ -259,7 +261,7 @@
           <a:p>
             <a:fld id="{762B48F5-BACC-47D6-A0F7-82FBF9C6BC85}" type="datetimeFigureOut">
               <a:rPr lang="en-US"/>
-              <a:t>1/10/20</a:t>
+              <a:t>1/11/20</a:t>
             </a:fld>
             <a:endParaRPr/>
           </a:p>
@@ -424,7 +426,7 @@
           <a:p>
             <a:fld id="{0CB1CD00-5424-4675-AB18-2C419B060449}" type="datetimeFigureOut">
               <a:rPr lang="en-US"/>
-              <a:t>1/10/20</a:t>
+              <a:t>1/11/20</a:t>
             </a:fld>
             <a:endParaRPr/>
           </a:p>
@@ -1069,7 +1071,7 @@
           <a:p>
             <a:fld id="{37CC0096-1860-4642-9CD2-0079EA5E7CD1}" type="datetimeFigureOut">
               <a:rPr lang="en-US" smtClean="0"/>
-              <a:t>1/10/20</a:t>
+              <a:t>1/11/20</a:t>
             </a:fld>
             <a:endParaRPr lang="en-US"/>
           </a:p>
@@ -1248,7 +1250,7 @@
           <a:p>
             <a:fld id="{37CC0096-1860-4642-9CD2-0079EA5E7CD1}" type="datetimeFigureOut">
               <a:rPr lang="en-US" smtClean="0"/>
-              <a:t>1/10/20</a:t>
+              <a:t>1/11/20</a:t>
             </a:fld>
             <a:endParaRPr lang="en-US"/>
           </a:p>
@@ -1421,7 +1423,7 @@
           <a:p>
             <a:fld id="{37CC0096-1860-4642-9CD2-0079EA5E7CD1}" type="datetimeFigureOut">
               <a:rPr lang="en-US" smtClean="0"/>
-              <a:t>1/10/20</a:t>
+              <a:t>1/11/20</a:t>
             </a:fld>
             <a:endParaRPr lang="en-US"/>
           </a:p>
@@ -1854,7 +1856,7 @@
           <a:p>
             <a:fld id="{37CC0096-1860-4642-9CD2-0079EA5E7CD1}" type="datetimeFigureOut">
               <a:rPr lang="en-US" smtClean="0"/>
-              <a:t>1/10/20</a:t>
+              <a:t>1/11/20</a:t>
             </a:fld>
             <a:endParaRPr lang="en-US"/>
           </a:p>
@@ -2293,7 +2295,7 @@
           <a:p>
             <a:fld id="{37CC0096-1860-4642-9CD2-0079EA5E7CD1}" type="datetimeFigureOut">
               <a:rPr lang="en-US" smtClean="0"/>
-              <a:t>1/10/20</a:t>
+              <a:t>1/11/20</a:t>
             </a:fld>
             <a:endParaRPr lang="en-US"/>
           </a:p>
@@ -2410,7 +2412,7 @@
           <a:p>
             <a:fld id="{37CC0096-1860-4642-9CD2-0079EA5E7CD1}" type="datetimeFigureOut">
               <a:rPr lang="en-US" smtClean="0"/>
-              <a:t>1/10/20</a:t>
+              <a:t>1/11/20</a:t>
             </a:fld>
             <a:endParaRPr lang="en-US"/>
           </a:p>
@@ -2505,7 +2507,7 @@
           <a:p>
             <a:fld id="{37CC0096-1860-4642-9CD2-0079EA5E7CD1}" type="datetimeFigureOut">
               <a:rPr lang="en-US" smtClean="0"/>
-              <a:t>1/10/20</a:t>
+              <a:t>1/11/20</a:t>
             </a:fld>
             <a:endParaRPr lang="en-US"/>
           </a:p>
@@ -2789,7 +2791,7 @@
           <a:p>
             <a:fld id="{37CC0096-1860-4642-9CD2-0079EA5E7CD1}" type="datetimeFigureOut">
               <a:rPr lang="en-US" smtClean="0"/>
-              <a:t>1/10/20</a:t>
+              <a:t>1/11/20</a:t>
             </a:fld>
             <a:endParaRPr lang="en-US"/>
           </a:p>
@@ -3100,7 +3102,7 @@
           <a:p>
             <a:fld id="{37CC0096-1860-4642-9CD2-0079EA5E7CD1}" type="datetimeFigureOut">
               <a:rPr lang="en-US" smtClean="0"/>
-              <a:t>1/10/20</a:t>
+              <a:t>1/11/20</a:t>
             </a:fld>
             <a:endParaRPr lang="en-US"/>
           </a:p>
@@ -3332,7 +3334,7 @@
             <a:fld id="{37CC0096-1860-4642-9CD2-0079EA5E7CD1}" type="datetimeFigureOut">
               <a:rPr lang="en-US" smtClean="0"/>
               <a:pPr/>
-              <a:t>1/10/20</a:t>
+              <a:t>1/11/20</a:t>
             </a:fld>
             <a:endParaRPr lang="en-US"/>
           </a:p>
@@ -3876,17 +3878,17 @@
           <a:p>
             <a:r>
               <a:rPr lang="en-US" dirty="0"/>
-              <a:t>Deaths vs Pills per Person</a:t>
+              <a:t>Number of Deaths vs Pill Rates</a:t>
             </a:r>
           </a:p>
         </p:txBody>
       </p:sp>
       <p:pic>
         <p:nvPicPr>
-          <p:cNvPr id="5" name="Content Placeholder 4" descr="A close up of a map&#10;&#10;Description automatically generated">
+          <p:cNvPr id="11" name="Content Placeholder 10" descr="A close up of a map&#10;&#10;Description automatically generated">
             <a:extLst>
               <a:ext uri="{FF2B5EF4-FFF2-40B4-BE49-F238E27FC236}">
-                <a16:creationId xmlns:a16="http://schemas.microsoft.com/office/drawing/2014/main" id="{CBCB6F4F-CCB1-7B4E-8AD0-B75DC0FC7E41}"/>
+                <a16:creationId xmlns:a16="http://schemas.microsoft.com/office/drawing/2014/main" id="{3C9CF445-CB32-CB4A-9A6E-4C398640157C}"/>
               </a:ext>
             </a:extLst>
           </p:cNvPr>
@@ -3911,8 +3913,8 @@
         </p:blipFill>
         <p:spPr>
           <a:xfrm>
-            <a:off x="114300" y="1203960"/>
-            <a:ext cx="8915400" cy="5349240"/>
+            <a:off x="381000" y="914400"/>
+            <a:ext cx="8382000" cy="5029200"/>
           </a:xfrm>
         </p:spPr>
       </p:pic>
@@ -3948,7 +3950,13 @@
       </p:grpSpPr>
       <p:sp>
         <p:nvSpPr>
-          <p:cNvPr id="2" name="Title 1"/>
+          <p:cNvPr id="2" name="Title 1">
+            <a:extLst>
+              <a:ext uri="{FF2B5EF4-FFF2-40B4-BE49-F238E27FC236}">
+                <a16:creationId xmlns:a16="http://schemas.microsoft.com/office/drawing/2014/main" id="{94D01112-B3B2-4732-B1EF-EB012F44AF10}"/>
+              </a:ext>
+            </a:extLst>
+          </p:cNvPr>
           <p:cNvSpPr>
             <a:spLocks noGrp="1"/>
           </p:cNvSpPr>
@@ -3956,35 +3964,417 @@
             <p:ph type="title"/>
           </p:nvPr>
         </p:nvSpPr>
-        <p:spPr/>
+        <p:spPr>
+          <a:xfrm>
+            <a:off x="1143000" y="304800"/>
+            <a:ext cx="6858000" cy="533400"/>
+          </a:xfrm>
+        </p:spPr>
         <p:txBody>
           <a:bodyPr/>
           <a:lstStyle/>
           <a:p>
             <a:r>
               <a:rPr lang="en-US" dirty="0"/>
-              <a:t>Add a Slide Title - 1</a:t>
-            </a:r>
-            <a:endParaRPr dirty="0"/>
-          </a:p>
-        </p:txBody>
-      </p:sp>
-      <p:sp>
-        <p:nvSpPr>
-          <p:cNvPr id="3" name="Text Placeholder 2"/>
-          <p:cNvSpPr>
-            <a:spLocks noGrp="1"/>
-          </p:cNvSpPr>
-          <p:nvPr>
-            <p:ph type="body" idx="1"/>
-          </p:nvPr>
-        </p:nvSpPr>
-        <p:spPr/>
+              <a:t>Death Rates vs Pill Rates</a:t>
+            </a:r>
+          </a:p>
+        </p:txBody>
+      </p:sp>
+      <p:pic>
+        <p:nvPicPr>
+          <p:cNvPr id="10" name="Content Placeholder 9" descr="A close up of a map&#10;&#10;Description automatically generated">
+            <a:extLst>
+              <a:ext uri="{FF2B5EF4-FFF2-40B4-BE49-F238E27FC236}">
+                <a16:creationId xmlns:a16="http://schemas.microsoft.com/office/drawing/2014/main" id="{21E25039-3104-6644-8A7B-01390147E06D}"/>
+              </a:ext>
+            </a:extLst>
+          </p:cNvPr>
+          <p:cNvPicPr>
+            <a:picLocks noGrp="1" noChangeAspect="1"/>
+          </p:cNvPicPr>
+          <p:nvPr>
+            <p:ph idx="1"/>
+          </p:nvPr>
+        </p:nvPicPr>
+        <p:blipFill>
+          <a:blip r:embed="rId2">
+            <a:extLst>
+              <a:ext uri="{28A0092B-C50C-407E-A947-70E740481C1C}">
+                <a14:useLocalDpi xmlns:a14="http://schemas.microsoft.com/office/drawing/2010/main" val="0"/>
+              </a:ext>
+            </a:extLst>
+          </a:blip>
+          <a:stretch>
+            <a:fillRect/>
+          </a:stretch>
+        </p:blipFill>
+        <p:spPr>
+          <a:xfrm>
+            <a:off x="381000" y="914400"/>
+            <a:ext cx="8382000" cy="5029200"/>
+          </a:xfrm>
+        </p:spPr>
+      </p:pic>
+    </p:spTree>
+    <p:extLst>
+      <p:ext uri="{BB962C8B-B14F-4D97-AF65-F5344CB8AC3E}">
+        <p14:creationId xmlns:p14="http://schemas.microsoft.com/office/powerpoint/2010/main" val="3565711200"/>
+      </p:ext>
+    </p:extLst>
+  </p:cSld>
+  <p:clrMapOvr>
+    <a:masterClrMapping/>
+  </p:clrMapOvr>
+</p:sld>
+</file>
+
+<file path=ppt/slides/slide12.xml><?xml version="1.0" encoding="utf-8"?>
+<p:sld xmlns:a="http://schemas.openxmlformats.org/drawingml/2006/main" xmlns:r="http://schemas.openxmlformats.org/officeDocument/2006/relationships" xmlns:p="http://schemas.openxmlformats.org/presentationml/2006/main">
+  <p:cSld>
+    <p:spTree>
+      <p:nvGrpSpPr>
+        <p:cNvPr id="1" name=""/>
+        <p:cNvGrpSpPr/>
+        <p:nvPr/>
+      </p:nvGrpSpPr>
+      <p:grpSpPr>
+        <a:xfrm>
+          <a:off x="0" y="0"/>
+          <a:ext cx="0" cy="0"/>
+          <a:chOff x="0" y="0"/>
+          <a:chExt cx="0" cy="0"/>
+        </a:xfrm>
+      </p:grpSpPr>
+      <p:sp>
+        <p:nvSpPr>
+          <p:cNvPr id="2" name="Title 1"/>
+          <p:cNvSpPr>
+            <a:spLocks noGrp="1"/>
+          </p:cNvSpPr>
+          <p:nvPr>
+            <p:ph type="title"/>
+          </p:nvPr>
+        </p:nvSpPr>
+        <p:spPr>
+          <a:xfrm>
+            <a:off x="1143000" y="333693"/>
+            <a:ext cx="6858000" cy="762000"/>
+          </a:xfrm>
+        </p:spPr>
         <p:txBody>
           <a:bodyPr/>
           <a:lstStyle/>
           <a:p>
-            <a:endParaRPr/>
+            <a:r>
+              <a:rPr lang="en-US" dirty="0"/>
+              <a:t>Conclusions and Summary</a:t>
+            </a:r>
+            <a:endParaRPr dirty="0"/>
+          </a:p>
+        </p:txBody>
+      </p:sp>
+      <p:sp>
+        <p:nvSpPr>
+          <p:cNvPr id="6" name="Content Placeholder 2">
+            <a:extLst>
+              <a:ext uri="{FF2B5EF4-FFF2-40B4-BE49-F238E27FC236}">
+                <a16:creationId xmlns:a16="http://schemas.microsoft.com/office/drawing/2014/main" id="{9BC389F4-F82D-C549-AE96-E472CA603567}"/>
+              </a:ext>
+            </a:extLst>
+          </p:cNvPr>
+          <p:cNvSpPr txBox="1">
+            <a:spLocks/>
+          </p:cNvSpPr>
+          <p:nvPr/>
+        </p:nvSpPr>
+        <p:spPr>
+          <a:xfrm>
+            <a:off x="1143000" y="1828800"/>
+            <a:ext cx="6858000" cy="4267200"/>
+          </a:xfrm>
+          <a:prstGeom prst="rect">
+            <a:avLst/>
+          </a:prstGeom>
+        </p:spPr>
+        <p:txBody>
+          <a:bodyPr vert="horz" lIns="91440" tIns="45720" rIns="91440" bIns="45720" rtlCol="0">
+            <a:normAutofit/>
+          </a:bodyPr>
+          <a:lstStyle>
+            <a:lvl1pPr marL="0" indent="0" algn="l" defTabSz="685800" rtl="0" eaLnBrk="1" latinLnBrk="0" hangingPunct="1">
+              <a:lnSpc>
+                <a:spcPct val="90000"/>
+              </a:lnSpc>
+              <a:spcBef>
+                <a:spcPts val="0"/>
+              </a:spcBef>
+              <a:buClr>
+                <a:schemeClr val="accent1"/>
+              </a:buClr>
+              <a:buFont typeface="Arial" pitchFamily="34" charset="0"/>
+              <a:buNone/>
+              <a:defRPr sz="1500" kern="1200">
+                <a:solidFill>
+                  <a:schemeClr val="accent1"/>
+                </a:solidFill>
+                <a:latin typeface="+mj-lt"/>
+                <a:ea typeface="+mn-ea"/>
+                <a:cs typeface="+mn-cs"/>
+              </a:defRPr>
+            </a:lvl1pPr>
+            <a:lvl2pPr marL="342900" indent="0" algn="l" defTabSz="685800" rtl="0" eaLnBrk="1" latinLnBrk="0" hangingPunct="1">
+              <a:lnSpc>
+                <a:spcPct val="90000"/>
+              </a:lnSpc>
+              <a:spcBef>
+                <a:spcPts val="750"/>
+              </a:spcBef>
+              <a:buClr>
+                <a:schemeClr val="accent1"/>
+              </a:buClr>
+              <a:buFont typeface="Arial" pitchFamily="34" charset="0"/>
+              <a:buNone/>
+              <a:defRPr sz="1500" kern="1200">
+                <a:solidFill>
+                  <a:schemeClr val="tx1">
+                    <a:lumMod val="85000"/>
+                  </a:schemeClr>
+                </a:solidFill>
+                <a:latin typeface="+mn-lt"/>
+                <a:ea typeface="+mn-ea"/>
+                <a:cs typeface="+mn-cs"/>
+              </a:defRPr>
+            </a:lvl2pPr>
+            <a:lvl3pPr marL="685800" indent="0" algn="l" defTabSz="685800" rtl="0" eaLnBrk="1" latinLnBrk="0" hangingPunct="1">
+              <a:lnSpc>
+                <a:spcPct val="90000"/>
+              </a:lnSpc>
+              <a:spcBef>
+                <a:spcPts val="600"/>
+              </a:spcBef>
+              <a:buClr>
+                <a:schemeClr val="accent1"/>
+              </a:buClr>
+              <a:buFont typeface="Arial" pitchFamily="34" charset="0"/>
+              <a:buNone/>
+              <a:defRPr sz="1350" kern="1200">
+                <a:solidFill>
+                  <a:schemeClr val="tx1">
+                    <a:lumMod val="85000"/>
+                  </a:schemeClr>
+                </a:solidFill>
+                <a:latin typeface="+mn-lt"/>
+                <a:ea typeface="+mn-ea"/>
+                <a:cs typeface="+mn-cs"/>
+              </a:defRPr>
+            </a:lvl3pPr>
+            <a:lvl4pPr marL="1028700" indent="0" algn="l" defTabSz="685800" rtl="0" eaLnBrk="1" latinLnBrk="0" hangingPunct="1">
+              <a:lnSpc>
+                <a:spcPct val="90000"/>
+              </a:lnSpc>
+              <a:spcBef>
+                <a:spcPts val="600"/>
+              </a:spcBef>
+              <a:buClr>
+                <a:schemeClr val="accent1"/>
+              </a:buClr>
+              <a:buFont typeface="Arial" pitchFamily="34" charset="0"/>
+              <a:buNone/>
+              <a:defRPr sz="1200" kern="1200">
+                <a:solidFill>
+                  <a:schemeClr val="tx1">
+                    <a:lumMod val="85000"/>
+                  </a:schemeClr>
+                </a:solidFill>
+                <a:latin typeface="+mn-lt"/>
+                <a:ea typeface="+mn-ea"/>
+                <a:cs typeface="+mn-cs"/>
+              </a:defRPr>
+            </a:lvl4pPr>
+            <a:lvl5pPr marL="1371600" indent="0" algn="l" defTabSz="685800" rtl="0" eaLnBrk="1" latinLnBrk="0" hangingPunct="1">
+              <a:lnSpc>
+                <a:spcPct val="90000"/>
+              </a:lnSpc>
+              <a:spcBef>
+                <a:spcPts val="600"/>
+              </a:spcBef>
+              <a:buClr>
+                <a:schemeClr val="accent1"/>
+              </a:buClr>
+              <a:buFont typeface="Arial" pitchFamily="34" charset="0"/>
+              <a:buNone/>
+              <a:defRPr sz="1200" kern="1200">
+                <a:solidFill>
+                  <a:schemeClr val="tx1">
+                    <a:lumMod val="85000"/>
+                  </a:schemeClr>
+                </a:solidFill>
+                <a:latin typeface="+mn-lt"/>
+                <a:ea typeface="+mn-ea"/>
+                <a:cs typeface="+mn-cs"/>
+              </a:defRPr>
+            </a:lvl5pPr>
+            <a:lvl6pPr marL="1714500" indent="0" algn="l" defTabSz="685800" rtl="0" eaLnBrk="1" latinLnBrk="0" hangingPunct="1">
+              <a:lnSpc>
+                <a:spcPct val="90000"/>
+              </a:lnSpc>
+              <a:spcBef>
+                <a:spcPts val="600"/>
+              </a:spcBef>
+              <a:buClr>
+                <a:schemeClr val="accent1"/>
+              </a:buClr>
+              <a:buFont typeface="Arial" pitchFamily="34" charset="0"/>
+              <a:buNone/>
+              <a:defRPr sz="1200" kern="1200">
+                <a:solidFill>
+                  <a:schemeClr val="tx1"/>
+                </a:solidFill>
+                <a:latin typeface="+mn-lt"/>
+                <a:ea typeface="+mn-ea"/>
+                <a:cs typeface="+mn-cs"/>
+              </a:defRPr>
+            </a:lvl6pPr>
+            <a:lvl7pPr marL="2057400" indent="0" algn="l" defTabSz="685800" rtl="0" eaLnBrk="1" latinLnBrk="0" hangingPunct="1">
+              <a:lnSpc>
+                <a:spcPct val="90000"/>
+              </a:lnSpc>
+              <a:spcBef>
+                <a:spcPts val="600"/>
+              </a:spcBef>
+              <a:buClr>
+                <a:schemeClr val="accent1"/>
+              </a:buClr>
+              <a:buFont typeface="Arial" pitchFamily="34" charset="0"/>
+              <a:buNone/>
+              <a:defRPr sz="1200" kern="1200">
+                <a:solidFill>
+                  <a:schemeClr val="tx1"/>
+                </a:solidFill>
+                <a:latin typeface="+mn-lt"/>
+                <a:ea typeface="+mn-ea"/>
+                <a:cs typeface="+mn-cs"/>
+              </a:defRPr>
+            </a:lvl7pPr>
+            <a:lvl8pPr marL="2400300" indent="0" algn="l" defTabSz="685800" rtl="0" eaLnBrk="1" latinLnBrk="0" hangingPunct="1">
+              <a:lnSpc>
+                <a:spcPct val="90000"/>
+              </a:lnSpc>
+              <a:spcBef>
+                <a:spcPts val="600"/>
+              </a:spcBef>
+              <a:buClr>
+                <a:schemeClr val="accent1"/>
+              </a:buClr>
+              <a:buFont typeface="Arial" pitchFamily="34" charset="0"/>
+              <a:buNone/>
+              <a:defRPr sz="1200" kern="1200">
+                <a:solidFill>
+                  <a:schemeClr val="tx1"/>
+                </a:solidFill>
+                <a:latin typeface="+mn-lt"/>
+                <a:ea typeface="+mn-ea"/>
+                <a:cs typeface="+mn-cs"/>
+              </a:defRPr>
+            </a:lvl8pPr>
+            <a:lvl9pPr marL="2743200" indent="0" algn="l" defTabSz="685800" rtl="0" eaLnBrk="1" latinLnBrk="0" hangingPunct="1">
+              <a:lnSpc>
+                <a:spcPct val="90000"/>
+              </a:lnSpc>
+              <a:spcBef>
+                <a:spcPts val="600"/>
+              </a:spcBef>
+              <a:buClr>
+                <a:schemeClr val="accent1"/>
+              </a:buClr>
+              <a:buFont typeface="Arial" pitchFamily="34" charset="0"/>
+              <a:buNone/>
+              <a:defRPr sz="1200" kern="1200">
+                <a:solidFill>
+                  <a:schemeClr val="tx1"/>
+                </a:solidFill>
+                <a:latin typeface="+mn-lt"/>
+                <a:ea typeface="+mn-ea"/>
+                <a:cs typeface="+mn-cs"/>
+              </a:defRPr>
+            </a:lvl9pPr>
+          </a:lstStyle>
+          <a:p>
+            <a:endParaRPr lang="en-US" dirty="0"/>
+          </a:p>
+        </p:txBody>
+      </p:sp>
+      <p:sp>
+        <p:nvSpPr>
+          <p:cNvPr id="10" name="TextBox 9">
+            <a:extLst>
+              <a:ext uri="{FF2B5EF4-FFF2-40B4-BE49-F238E27FC236}">
+                <a16:creationId xmlns:a16="http://schemas.microsoft.com/office/drawing/2014/main" id="{506C0950-5FD9-2844-B7EB-13FC8AF1CE65}"/>
+              </a:ext>
+            </a:extLst>
+          </p:cNvPr>
+          <p:cNvSpPr txBox="1"/>
+          <p:nvPr/>
+        </p:nvSpPr>
+        <p:spPr>
+          <a:xfrm>
+            <a:off x="1356360" y="1676400"/>
+            <a:ext cx="6667500" cy="2031325"/>
+          </a:xfrm>
+          <a:prstGeom prst="rect">
+            <a:avLst/>
+          </a:prstGeom>
+          <a:noFill/>
+        </p:spPr>
+        <p:txBody>
+          <a:bodyPr wrap="square" rtlCol="0">
+            <a:spAutoFit/>
+          </a:bodyPr>
+          <a:lstStyle/>
+          <a:p>
+            <a:pPr marL="285750" indent="-285750">
+              <a:buFont typeface="Arial" panose="020B0604020202020204" pitchFamily="34" charset="0"/>
+              <a:buChar char="•"/>
+            </a:pPr>
+            <a:r>
+              <a:rPr lang="en-US" dirty="0"/>
+              <a:t>Number of Pills is not a good predictor at differentiating between black and white communities.</a:t>
+            </a:r>
+          </a:p>
+          <a:p>
+            <a:pPr marL="285750" indent="-285750">
+              <a:buFont typeface="Arial" panose="020B0604020202020204" pitchFamily="34" charset="0"/>
+              <a:buChar char="•"/>
+            </a:pPr>
+            <a:endParaRPr lang="en-US" dirty="0"/>
+          </a:p>
+          <a:p>
+            <a:pPr marL="285750" indent="-285750">
+              <a:buFont typeface="Arial" panose="020B0604020202020204" pitchFamily="34" charset="0"/>
+              <a:buChar char="•"/>
+            </a:pPr>
+            <a:r>
+              <a:rPr lang="en-US" dirty="0"/>
+              <a:t>Number of Pills and Number of Deaths have similar distributions. Accepted null hypothesis.</a:t>
+            </a:r>
+          </a:p>
+          <a:p>
+            <a:pPr marL="285750" indent="-285750">
+              <a:buFont typeface="Arial" panose="020B0604020202020204" pitchFamily="34" charset="0"/>
+              <a:buChar char="•"/>
+            </a:pPr>
+            <a:endParaRPr lang="en-US" dirty="0"/>
+          </a:p>
+          <a:p>
+            <a:pPr marL="285750" indent="-285750">
+              <a:buFont typeface="Arial" panose="020B0604020202020204" pitchFamily="34" charset="0"/>
+              <a:buChar char="•"/>
+            </a:pPr>
+            <a:r>
+              <a:rPr lang="en-US" dirty="0"/>
+              <a:t>Comparing Pill Rates and Death Rates</a:t>
+            </a:r>
           </a:p>
         </p:txBody>
       </p:sp>
@@ -4166,7 +4556,7 @@
           <a:p>
             <a:r>
               <a:rPr lang="en-US" sz="4000" dirty="0"/>
-              <a:t>Hypothesis</a:t>
+              <a:t>Hypotheses</a:t>
             </a:r>
           </a:p>
         </p:txBody>
@@ -4194,19 +4584,25 @@
           <a:p>
             <a:r>
               <a:rPr lang="en-US" dirty="0"/>
-              <a:t>If the number of pills and death rates are related, then higher than average death rates will have higher than average number of pills</a:t>
+              <a:t>If the number of pills and death rates are related, then higher than average death rates will have higher than average number of pills.</a:t>
             </a:r>
           </a:p>
           <a:p>
             <a:r>
               <a:rPr lang="en-US" dirty="0"/>
-              <a:t>If income and number of pills are related, then higher incomes will have a higher number of pills</a:t>
+              <a:t>If income and number of pills are related, then higher incomes will have a greater number of pills.</a:t>
             </a:r>
           </a:p>
           <a:p>
             <a:r>
               <a:rPr lang="en-US" dirty="0"/>
-              <a:t>If death rates and race are related, then black communities will have a higher death rate than white communities.</a:t>
+              <a:t>If death rates and race are related, then black communities will have  higher death rates than white communities.</a:t>
+            </a:r>
+          </a:p>
+          <a:p>
+            <a:r>
+              <a:rPr lang="en-US" dirty="0"/>
+              <a:t>If pill rates and death rates are related, then higher than average death rates will have higher than average number of pills.</a:t>
             </a:r>
           </a:p>
           <a:p>
@@ -4628,7 +5024,7 @@
           <p:cNvPr id="2" name="Title 1">
             <a:extLst>
               <a:ext uri="{FF2B5EF4-FFF2-40B4-BE49-F238E27FC236}">
-                <a16:creationId xmlns:a16="http://schemas.microsoft.com/office/drawing/2014/main" id="{61775B7F-B532-4A7B-B8BA-059F7B32A628}"/>
+                <a16:creationId xmlns:a16="http://schemas.microsoft.com/office/drawing/2014/main" id="{94D01112-B3B2-4732-B1EF-EB012F44AF10}"/>
               </a:ext>
             </a:extLst>
           </p:cNvPr>
@@ -4641,24 +5037,27 @@
         </p:nvSpPr>
         <p:spPr>
           <a:xfrm>
-            <a:off x="1371600" y="0"/>
-            <a:ext cx="6858000" cy="1143000"/>
+            <a:off x="1143000" y="457200"/>
+            <a:ext cx="6858000" cy="685800"/>
           </a:xfrm>
         </p:spPr>
         <p:txBody>
           <a:bodyPr/>
           <a:lstStyle/>
           <a:p>
-            <a:endParaRPr lang="en-US" dirty="0"/>
+            <a:r>
+              <a:rPr lang="en-US" dirty="0"/>
+              <a:t>Top Zip Codes with Most Pills</a:t>
+            </a:r>
           </a:p>
         </p:txBody>
       </p:sp>
       <p:pic>
         <p:nvPicPr>
-          <p:cNvPr id="5" name="Content Placeholder 4">
+          <p:cNvPr id="13" name="Content Placeholder 12" descr="A screenshot of a cell phone&#10;&#10;Description automatically generated">
             <a:extLst>
               <a:ext uri="{FF2B5EF4-FFF2-40B4-BE49-F238E27FC236}">
-                <a16:creationId xmlns:a16="http://schemas.microsoft.com/office/drawing/2014/main" id="{4C62A2AE-0F83-4BAF-923E-A3872B8A6795}"/>
+                <a16:creationId xmlns:a16="http://schemas.microsoft.com/office/drawing/2014/main" id="{8810E6A7-1156-C74E-90B4-6A1FC1F38406}"/>
               </a:ext>
             </a:extLst>
           </p:cNvPr>
@@ -4670,7 +5069,7 @@
           </p:nvPr>
         </p:nvPicPr>
         <p:blipFill>
-          <a:blip r:embed="rId2" cstate="print">
+          <a:blip r:embed="rId2">
             <a:extLst>
               <a:ext uri="{28A0092B-C50C-407E-A947-70E740481C1C}">
                 <a14:useLocalDpi xmlns:a14="http://schemas.microsoft.com/office/drawing/2010/main" val="0"/>
@@ -4683,15 +5082,15 @@
         </p:blipFill>
         <p:spPr>
           <a:xfrm>
-            <a:off x="-1" y="2743200"/>
-            <a:ext cx="9144001" cy="4114800"/>
+            <a:off x="0" y="1600200"/>
+            <a:ext cx="9144000" cy="3657600"/>
           </a:xfrm>
         </p:spPr>
       </p:pic>
     </p:spTree>
     <p:extLst>
       <p:ext uri="{BB962C8B-B14F-4D97-AF65-F5344CB8AC3E}">
-        <p14:creationId xmlns:p14="http://schemas.microsoft.com/office/powerpoint/2010/main" val="153881094"/>
+        <p14:creationId xmlns:p14="http://schemas.microsoft.com/office/powerpoint/2010/main" val="770824712"/>
       </p:ext>
     </p:extLst>
   </p:cSld>
@@ -4702,6 +5101,104 @@
 </file>
 
 <file path=ppt/slides/slide7.xml><?xml version="1.0" encoding="utf-8"?>
+<p:sld xmlns:a="http://schemas.openxmlformats.org/drawingml/2006/main" xmlns:r="http://schemas.openxmlformats.org/officeDocument/2006/relationships" xmlns:p="http://schemas.openxmlformats.org/presentationml/2006/main">
+  <p:cSld>
+    <p:spTree>
+      <p:nvGrpSpPr>
+        <p:cNvPr id="1" name=""/>
+        <p:cNvGrpSpPr/>
+        <p:nvPr/>
+      </p:nvGrpSpPr>
+      <p:grpSpPr>
+        <a:xfrm>
+          <a:off x="0" y="0"/>
+          <a:ext cx="0" cy="0"/>
+          <a:chOff x="0" y="0"/>
+          <a:chExt cx="0" cy="0"/>
+        </a:xfrm>
+      </p:grpSpPr>
+      <p:sp>
+        <p:nvSpPr>
+          <p:cNvPr id="2" name="Title 1">
+            <a:extLst>
+              <a:ext uri="{FF2B5EF4-FFF2-40B4-BE49-F238E27FC236}">
+                <a16:creationId xmlns:a16="http://schemas.microsoft.com/office/drawing/2014/main" id="{94D01112-B3B2-4732-B1EF-EB012F44AF10}"/>
+              </a:ext>
+            </a:extLst>
+          </p:cNvPr>
+          <p:cNvSpPr>
+            <a:spLocks noGrp="1"/>
+          </p:cNvSpPr>
+          <p:nvPr>
+            <p:ph type="title"/>
+          </p:nvPr>
+        </p:nvSpPr>
+        <p:spPr>
+          <a:xfrm>
+            <a:off x="1143000" y="457200"/>
+            <a:ext cx="6858000" cy="685800"/>
+          </a:xfrm>
+        </p:spPr>
+        <p:txBody>
+          <a:bodyPr/>
+          <a:lstStyle/>
+          <a:p>
+            <a:r>
+              <a:rPr lang="en-US" dirty="0"/>
+              <a:t>Top Cities with Most Pills Per Person</a:t>
+            </a:r>
+          </a:p>
+        </p:txBody>
+      </p:sp>
+      <p:pic>
+        <p:nvPicPr>
+          <p:cNvPr id="9" name="Content Placeholder 8" descr="A screenshot of a cell phone&#10;&#10;Description automatically generated">
+            <a:extLst>
+              <a:ext uri="{FF2B5EF4-FFF2-40B4-BE49-F238E27FC236}">
+                <a16:creationId xmlns:a16="http://schemas.microsoft.com/office/drawing/2014/main" id="{6B935740-C4BE-BB4A-9798-A06E505CEC2F}"/>
+              </a:ext>
+            </a:extLst>
+          </p:cNvPr>
+          <p:cNvPicPr>
+            <a:picLocks noGrp="1" noChangeAspect="1"/>
+          </p:cNvPicPr>
+          <p:nvPr>
+            <p:ph idx="1"/>
+          </p:nvPr>
+        </p:nvPicPr>
+        <p:blipFill>
+          <a:blip r:embed="rId2">
+            <a:extLst>
+              <a:ext uri="{28A0092B-C50C-407E-A947-70E740481C1C}">
+                <a14:useLocalDpi xmlns:a14="http://schemas.microsoft.com/office/drawing/2010/main" val="0"/>
+              </a:ext>
+            </a:extLst>
+          </a:blip>
+          <a:stretch>
+            <a:fillRect/>
+          </a:stretch>
+        </p:blipFill>
+        <p:spPr>
+          <a:xfrm>
+            <a:off x="0" y="1752600"/>
+            <a:ext cx="9144000" cy="3657600"/>
+          </a:xfrm>
+        </p:spPr>
+      </p:pic>
+    </p:spTree>
+    <p:extLst>
+      <p:ext uri="{BB962C8B-B14F-4D97-AF65-F5344CB8AC3E}">
+        <p14:creationId xmlns:p14="http://schemas.microsoft.com/office/powerpoint/2010/main" val="1686892317"/>
+      </p:ext>
+    </p:extLst>
+  </p:cSld>
+  <p:clrMapOvr>
+    <a:masterClrMapping/>
+  </p:clrMapOvr>
+</p:sld>
+</file>
+
+<file path=ppt/slides/slide8.xml><?xml version="1.0" encoding="utf-8"?>
 <p:sld xmlns:a="http://schemas.openxmlformats.org/drawingml/2006/main" xmlns:r="http://schemas.openxmlformats.org/officeDocument/2006/relationships" xmlns:p="http://schemas.openxmlformats.org/presentationml/2006/main">
   <p:cSld>
     <p:spTree>
@@ -4915,89 +5412,6 @@
     <p:extLst>
       <p:ext uri="{BB962C8B-B14F-4D97-AF65-F5344CB8AC3E}">
         <p14:creationId xmlns:p14="http://schemas.microsoft.com/office/powerpoint/2010/main" val="3428833997"/>
-      </p:ext>
-    </p:extLst>
-  </p:cSld>
-  <p:clrMapOvr>
-    <a:masterClrMapping/>
-  </p:clrMapOvr>
-</p:sld>
-</file>
-
-<file path=ppt/slides/slide8.xml><?xml version="1.0" encoding="utf-8"?>
-<p:sld xmlns:a="http://schemas.openxmlformats.org/drawingml/2006/main" xmlns:r="http://schemas.openxmlformats.org/officeDocument/2006/relationships" xmlns:p="http://schemas.openxmlformats.org/presentationml/2006/main">
-  <p:cSld>
-    <p:spTree>
-      <p:nvGrpSpPr>
-        <p:cNvPr id="1" name=""/>
-        <p:cNvGrpSpPr/>
-        <p:nvPr/>
-      </p:nvGrpSpPr>
-      <p:grpSpPr>
-        <a:xfrm>
-          <a:off x="0" y="0"/>
-          <a:ext cx="0" cy="0"/>
-          <a:chOff x="0" y="0"/>
-          <a:chExt cx="0" cy="0"/>
-        </a:xfrm>
-      </p:grpSpPr>
-      <p:sp>
-        <p:nvSpPr>
-          <p:cNvPr id="2" name="Title 1">
-            <a:extLst>
-              <a:ext uri="{FF2B5EF4-FFF2-40B4-BE49-F238E27FC236}">
-                <a16:creationId xmlns:a16="http://schemas.microsoft.com/office/drawing/2014/main" id="{94D01112-B3B2-4732-B1EF-EB012F44AF10}"/>
-              </a:ext>
-            </a:extLst>
-          </p:cNvPr>
-          <p:cNvSpPr>
-            <a:spLocks noGrp="1"/>
-          </p:cNvSpPr>
-          <p:nvPr>
-            <p:ph type="title"/>
-          </p:nvPr>
-        </p:nvSpPr>
-        <p:spPr/>
-        <p:txBody>
-          <a:bodyPr/>
-          <a:lstStyle/>
-          <a:p>
-            <a:r>
-              <a:rPr lang="en-US" dirty="0"/>
-              <a:t>Top Ten Cities with Most Pills Per Person</a:t>
-            </a:r>
-          </a:p>
-        </p:txBody>
-      </p:sp>
-      <p:sp>
-        <p:nvSpPr>
-          <p:cNvPr id="3" name="Content Placeholder 2">
-            <a:extLst>
-              <a:ext uri="{FF2B5EF4-FFF2-40B4-BE49-F238E27FC236}">
-                <a16:creationId xmlns:a16="http://schemas.microsoft.com/office/drawing/2014/main" id="{D5D6F6DF-51F4-4418-92E7-7BB2CF50FC97}"/>
-              </a:ext>
-            </a:extLst>
-          </p:cNvPr>
-          <p:cNvSpPr>
-            <a:spLocks noGrp="1"/>
-          </p:cNvSpPr>
-          <p:nvPr>
-            <p:ph idx="1"/>
-          </p:nvPr>
-        </p:nvSpPr>
-        <p:spPr/>
-        <p:txBody>
-          <a:bodyPr/>
-          <a:lstStyle/>
-          <a:p>
-            <a:endParaRPr lang="en-US" dirty="0"/>
-          </a:p>
-        </p:txBody>
-      </p:sp>
-    </p:spTree>
-    <p:extLst>
-      <p:ext uri="{BB962C8B-B14F-4D97-AF65-F5344CB8AC3E}">
-        <p14:creationId xmlns:p14="http://schemas.microsoft.com/office/powerpoint/2010/main" val="770824712"/>
       </p:ext>
     </p:extLst>
   </p:cSld>

</xml_diff>

<commit_message>
Changes made tp PPT
</commit_message>
<xml_diff>
--- a/Prescription Pain Pills.pptx
+++ b/Prescription Pain Pills.pptx
@@ -261,7 +261,7 @@
           <a:p>
             <a:fld id="{762B48F5-BACC-47D6-A0F7-82FBF9C6BC85}" type="datetimeFigureOut">
               <a:rPr lang="en-US"/>
-              <a:t>1/11/20</a:t>
+              <a:t>1/11/2020</a:t>
             </a:fld>
             <a:endParaRPr/>
           </a:p>
@@ -426,7 +426,7 @@
           <a:p>
             <a:fld id="{0CB1CD00-5424-4675-AB18-2C419B060449}" type="datetimeFigureOut">
               <a:rPr lang="en-US"/>
-              <a:t>1/11/20</a:t>
+              <a:t>1/11/2020</a:t>
             </a:fld>
             <a:endParaRPr/>
           </a:p>
@@ -1071,7 +1071,7 @@
           <a:p>
             <a:fld id="{37CC0096-1860-4642-9CD2-0079EA5E7CD1}" type="datetimeFigureOut">
               <a:rPr lang="en-US" smtClean="0"/>
-              <a:t>1/11/20</a:t>
+              <a:t>1/11/2020</a:t>
             </a:fld>
             <a:endParaRPr lang="en-US"/>
           </a:p>
@@ -1250,7 +1250,7 @@
           <a:p>
             <a:fld id="{37CC0096-1860-4642-9CD2-0079EA5E7CD1}" type="datetimeFigureOut">
               <a:rPr lang="en-US" smtClean="0"/>
-              <a:t>1/11/20</a:t>
+              <a:t>1/11/2020</a:t>
             </a:fld>
             <a:endParaRPr lang="en-US"/>
           </a:p>
@@ -1423,7 +1423,7 @@
           <a:p>
             <a:fld id="{37CC0096-1860-4642-9CD2-0079EA5E7CD1}" type="datetimeFigureOut">
               <a:rPr lang="en-US" smtClean="0"/>
-              <a:t>1/11/20</a:t>
+              <a:t>1/11/2020</a:t>
             </a:fld>
             <a:endParaRPr lang="en-US"/>
           </a:p>
@@ -1856,7 +1856,7 @@
           <a:p>
             <a:fld id="{37CC0096-1860-4642-9CD2-0079EA5E7CD1}" type="datetimeFigureOut">
               <a:rPr lang="en-US" smtClean="0"/>
-              <a:t>1/11/20</a:t>
+              <a:t>1/11/2020</a:t>
             </a:fld>
             <a:endParaRPr lang="en-US"/>
           </a:p>
@@ -2295,7 +2295,7 @@
           <a:p>
             <a:fld id="{37CC0096-1860-4642-9CD2-0079EA5E7CD1}" type="datetimeFigureOut">
               <a:rPr lang="en-US" smtClean="0"/>
-              <a:t>1/11/20</a:t>
+              <a:t>1/11/2020</a:t>
             </a:fld>
             <a:endParaRPr lang="en-US"/>
           </a:p>
@@ -2412,7 +2412,7 @@
           <a:p>
             <a:fld id="{37CC0096-1860-4642-9CD2-0079EA5E7CD1}" type="datetimeFigureOut">
               <a:rPr lang="en-US" smtClean="0"/>
-              <a:t>1/11/20</a:t>
+              <a:t>1/11/2020</a:t>
             </a:fld>
             <a:endParaRPr lang="en-US"/>
           </a:p>
@@ -2507,7 +2507,7 @@
           <a:p>
             <a:fld id="{37CC0096-1860-4642-9CD2-0079EA5E7CD1}" type="datetimeFigureOut">
               <a:rPr lang="en-US" smtClean="0"/>
-              <a:t>1/11/20</a:t>
+              <a:t>1/11/2020</a:t>
             </a:fld>
             <a:endParaRPr lang="en-US"/>
           </a:p>
@@ -2791,7 +2791,7 @@
           <a:p>
             <a:fld id="{37CC0096-1860-4642-9CD2-0079EA5E7CD1}" type="datetimeFigureOut">
               <a:rPr lang="en-US" smtClean="0"/>
-              <a:t>1/11/20</a:t>
+              <a:t>1/11/2020</a:t>
             </a:fld>
             <a:endParaRPr lang="en-US"/>
           </a:p>
@@ -3102,7 +3102,7 @@
           <a:p>
             <a:fld id="{37CC0096-1860-4642-9CD2-0079EA5E7CD1}" type="datetimeFigureOut">
               <a:rPr lang="en-US" smtClean="0"/>
-              <a:t>1/11/20</a:t>
+              <a:t>1/11/2020</a:t>
             </a:fld>
             <a:endParaRPr lang="en-US"/>
           </a:p>
@@ -3334,7 +3334,7 @@
             <a:fld id="{37CC0096-1860-4642-9CD2-0079EA5E7CD1}" type="datetimeFigureOut">
               <a:rPr lang="en-US" smtClean="0"/>
               <a:pPr/>
-              <a:t>1/11/20</a:t>
+              <a:t>1/11/2020</a:t>
             </a:fld>
             <a:endParaRPr lang="en-US"/>
           </a:p>
@@ -3900,7 +3900,7 @@
           </p:nvPr>
         </p:nvPicPr>
         <p:blipFill>
-          <a:blip r:embed="rId2">
+          <a:blip r:embed="rId2" cstate="print">
             <a:extLst>
               <a:ext uri="{28A0092B-C50C-407E-A947-70E740481C1C}">
                 <a14:useLocalDpi xmlns:a14="http://schemas.microsoft.com/office/drawing/2010/main" val="0"/>
@@ -3998,7 +3998,7 @@
           </p:nvPr>
         </p:nvPicPr>
         <p:blipFill>
-          <a:blip r:embed="rId2">
+          <a:blip r:embed="rId2" cstate="print">
             <a:extLst>
               <a:ext uri="{28A0092B-C50C-407E-A947-70E740481C1C}">
                 <a14:useLocalDpi xmlns:a14="http://schemas.microsoft.com/office/drawing/2010/main" val="0"/>
@@ -4319,8 +4319,8 @@
         </p:nvSpPr>
         <p:spPr>
           <a:xfrm>
-            <a:off x="1356360" y="1676400"/>
-            <a:ext cx="6667500" cy="2031325"/>
+            <a:off x="1333500" y="1676400"/>
+            <a:ext cx="6667500" cy="1477328"/>
           </a:xfrm>
           <a:prstGeom prst="rect">
             <a:avLst/>
@@ -4345,34 +4345,8 @@
               <a:buChar char="•"/>
             </a:pPr>
             <a:r>
-              <a:rPr lang="en-US" dirty="0">
-                <a:solidFill>
-                  <a:schemeClr val="accent1"/>
-                </a:solidFill>
-              </a:rPr>
-              <a:t>Pill Rates </a:t>
-            </a:r>
-            <a:r>
               <a:rPr lang="en-US" dirty="0"/>
-              <a:t>and </a:t>
-            </a:r>
-            <a:r>
-              <a:rPr lang="en-US" dirty="0">
-                <a:solidFill>
-                  <a:schemeClr val="accent1"/>
-                </a:solidFill>
-              </a:rPr>
-              <a:t>Number of Deaths </a:t>
-            </a:r>
-            <a:r>
-              <a:rPr lang="en-US" dirty="0"/>
-              <a:t>have similar distributions and more pills per person does not yield greater number of deaths from overdoses.</a:t>
-            </a:r>
-          </a:p>
-          <a:p>
-            <a:r>
-              <a:rPr lang="en-US" dirty="0"/>
-              <a:t> </a:t>
+              <a:t>Number of Pills and Number of Deaths have similar distributions. Accepted null hypothesis.</a:t>
             </a:r>
           </a:p>
           <a:p>
@@ -4380,39 +4354,17 @@
               <a:buFont typeface="Arial" panose="020B0604020202020204" pitchFamily="34" charset="0"/>
               <a:buChar char="•"/>
             </a:pPr>
+            <a:endParaRPr lang="en-US" dirty="0"/>
+          </a:p>
+          <a:p>
+            <a:pPr marL="285750" indent="-285750">
+              <a:buFont typeface="Arial" panose="020B0604020202020204" pitchFamily="34" charset="0"/>
+              <a:buChar char="•"/>
+            </a:pPr>
             <a:r>
               <a:rPr lang="en-US" dirty="0"/>
-              <a:t>Higher than average </a:t>
-            </a:r>
-            <a:r>
-              <a:rPr lang="en-US" dirty="0">
-                <a:solidFill>
-                  <a:schemeClr val="accent1"/>
-                </a:solidFill>
-              </a:rPr>
-              <a:t>Pill Rates </a:t>
-            </a:r>
-            <a:r>
-              <a:rPr lang="en-US" dirty="0"/>
-              <a:t>does seem to be a good predictor for higher than average </a:t>
-            </a:r>
-            <a:r>
-              <a:rPr lang="en-US" dirty="0">
-                <a:solidFill>
-                  <a:schemeClr val="accent1"/>
-                </a:solidFill>
-              </a:rPr>
-              <a:t>Death Rates</a:t>
-            </a:r>
-            <a:r>
-              <a:rPr lang="en-US" dirty="0"/>
-              <a:t>.</a:t>
-            </a:r>
-            <a:endParaRPr lang="en-US" dirty="0">
-              <a:solidFill>
-                <a:schemeClr val="accent1"/>
-              </a:solidFill>
-            </a:endParaRPr>
+              <a:t>Higher than average Pill Rates.</a:t>
+            </a:r>
           </a:p>
         </p:txBody>
       </p:sp>
@@ -4637,61 +4589,13 @@
           <a:p>
             <a:r>
               <a:rPr lang="en-US" dirty="0"/>
-              <a:t>If the </a:t>
-            </a:r>
-            <a:r>
-              <a:rPr lang="en-US" dirty="0">
-                <a:solidFill>
-                  <a:schemeClr val="accent1"/>
-                </a:solidFill>
-              </a:rPr>
-              <a:t>pill rates </a:t>
-            </a:r>
+              <a:t>If the number of pills and death rates are related, then higher than average death rates will have higher than average number of pills.</a:t>
+            </a:r>
+          </a:p>
+          <a:p>
             <a:r>
               <a:rPr lang="en-US" dirty="0"/>
-              <a:t>and </a:t>
-            </a:r>
-            <a:r>
-              <a:rPr lang="en-US" dirty="0">
-                <a:solidFill>
-                  <a:srgbClr val="00B0F0"/>
-                </a:solidFill>
-              </a:rPr>
-              <a:t>number of deaths </a:t>
-            </a:r>
-            <a:r>
-              <a:rPr lang="en-US" dirty="0"/>
-              <a:t>are related, then higher than average death rates will have higher than average number of pills.</a:t>
-            </a:r>
-          </a:p>
-          <a:p>
-            <a:r>
-              <a:rPr lang="en-US" dirty="0"/>
-              <a:t>If </a:t>
-            </a:r>
-            <a:r>
-              <a:rPr lang="en-US" dirty="0">
-                <a:solidFill>
-                  <a:schemeClr val="accent1"/>
-                </a:solidFill>
-              </a:rPr>
-              <a:t>pill rates </a:t>
-            </a:r>
-            <a:r>
-              <a:rPr lang="en-US" dirty="0"/>
-              <a:t>and </a:t>
-            </a:r>
-            <a:r>
-              <a:rPr lang="en-US" dirty="0">
-                <a:solidFill>
-                  <a:srgbClr val="FFFF00"/>
-                </a:solidFill>
-              </a:rPr>
-              <a:t>death rates </a:t>
-            </a:r>
-            <a:r>
-              <a:rPr lang="en-US" dirty="0"/>
-              <a:t>are related, then higher than average death rates will have higher than average number of pills.</a:t>
+              <a:t>If pill rates and death rates are related, then higher than average death rates will have higher than average number of pills.</a:t>
             </a:r>
           </a:p>
           <a:p>
@@ -5145,7 +5049,7 @@
           </p:nvPr>
         </p:nvPicPr>
         <p:blipFill>
-          <a:blip r:embed="rId2">
+          <a:blip r:embed="rId2" cstate="print">
             <a:extLst>
               <a:ext uri="{28A0092B-C50C-407E-A947-70E740481C1C}">
                 <a14:useLocalDpi xmlns:a14="http://schemas.microsoft.com/office/drawing/2010/main" val="0"/>
@@ -5243,7 +5147,7 @@
           </p:nvPr>
         </p:nvPicPr>
         <p:blipFill>
-          <a:blip r:embed="rId2">
+          <a:blip r:embed="rId2" cstate="print">
             <a:extLst>
               <a:ext uri="{28A0092B-C50C-407E-A947-70E740481C1C}">
                 <a14:useLocalDpi xmlns:a14="http://schemas.microsoft.com/office/drawing/2010/main" val="0"/>
@@ -5321,19 +5225,17 @@
       </p:sp>
       <p:pic>
         <p:nvPicPr>
-          <p:cNvPr id="7" name="Content Placeholder 6">
+          <p:cNvPr id="8" name="Picture 7">
             <a:extLst>
               <a:ext uri="{FF2B5EF4-FFF2-40B4-BE49-F238E27FC236}">
-                <a16:creationId xmlns:a16="http://schemas.microsoft.com/office/drawing/2014/main" id="{3DE9820C-37E3-407F-8499-F8F26D75406E}"/>
+                <a16:creationId xmlns:a16="http://schemas.microsoft.com/office/drawing/2014/main" id="{5A5DD584-6CEE-4184-8F14-058FF59806EB}"/>
               </a:ext>
             </a:extLst>
           </p:cNvPr>
           <p:cNvPicPr>
-            <a:picLocks noGrp="1" noChangeAspect="1"/>
+            <a:picLocks noChangeAspect="1"/>
           </p:cNvPicPr>
-          <p:nvPr>
-            <p:ph idx="1"/>
-          </p:nvPr>
+          <p:nvPr/>
         </p:nvPicPr>
         <p:blipFill>
           <a:blip r:embed="rId2"/>
@@ -5343,20 +5245,123 @@
         </p:blipFill>
         <p:spPr>
           <a:xfrm>
-            <a:off x="-47698" y="2714624"/>
-            <a:ext cx="6610423" cy="4143375"/>
+            <a:off x="6692492" y="4419599"/>
+            <a:ext cx="2419350" cy="2438400"/>
           </a:xfrm>
           <a:prstGeom prst="rect">
             <a:avLst/>
           </a:prstGeom>
         </p:spPr>
       </p:pic>
+      <p:sp>
+        <p:nvSpPr>
+          <p:cNvPr id="9" name="TextBox 8">
+            <a:extLst>
+              <a:ext uri="{FF2B5EF4-FFF2-40B4-BE49-F238E27FC236}">
+                <a16:creationId xmlns:a16="http://schemas.microsoft.com/office/drawing/2014/main" id="{73794508-4138-4CF9-BDB0-26DDC78C1F9A}"/>
+              </a:ext>
+            </a:extLst>
+          </p:cNvPr>
+          <p:cNvSpPr txBox="1"/>
+          <p:nvPr/>
+        </p:nvSpPr>
+        <p:spPr>
+          <a:xfrm>
+            <a:off x="457200" y="1905000"/>
+            <a:ext cx="5063502" cy="646331"/>
+          </a:xfrm>
+          <a:prstGeom prst="rect">
+            <a:avLst/>
+          </a:prstGeom>
+          <a:noFill/>
+        </p:spPr>
+        <p:txBody>
+          <a:bodyPr wrap="none" rtlCol="0">
+            <a:spAutoFit/>
+          </a:bodyPr>
+          <a:lstStyle/>
+          <a:p>
+            <a:pPr marL="171450" indent="-171450">
+              <a:buFont typeface="Arial" panose="020B0604020202020204" pitchFamily="34" charset="0"/>
+              <a:buChar char="•"/>
+            </a:pPr>
+            <a:r>
+              <a:rPr lang="en-US" sz="1200" dirty="0">
+                <a:solidFill>
+                  <a:srgbClr val="FF0000"/>
+                </a:solidFill>
+              </a:rPr>
+              <a:t>1</a:t>
+            </a:r>
+            <a:r>
+              <a:rPr lang="en-US" sz="1200" baseline="30000" dirty="0">
+                <a:solidFill>
+                  <a:srgbClr val="FF0000"/>
+                </a:solidFill>
+              </a:rPr>
+              <a:t>st</a:t>
+            </a:r>
+            <a:r>
+              <a:rPr lang="en-US" sz="1200" dirty="0">
+                <a:solidFill>
+                  <a:srgbClr val="FF0000"/>
+                </a:solidFill>
+              </a:rPr>
+              <a:t> quartile and minimum was not displayed because median was zero</a:t>
+            </a:r>
+          </a:p>
+          <a:p>
+            <a:pPr marL="171450" indent="-171450">
+              <a:buFont typeface="Arial" panose="020B0604020202020204" pitchFamily="34" charset="0"/>
+              <a:buChar char="•"/>
+            </a:pPr>
+            <a:r>
+              <a:rPr lang="en-US" sz="1200" dirty="0">
+                <a:solidFill>
+                  <a:srgbClr val="FF0000"/>
+                </a:solidFill>
+              </a:rPr>
+              <a:t>4</a:t>
+            </a:r>
+            <a:r>
+              <a:rPr lang="en-US" sz="1200" baseline="30000" dirty="0">
+                <a:solidFill>
+                  <a:srgbClr val="FF0000"/>
+                </a:solidFill>
+              </a:rPr>
+              <a:t>th</a:t>
+            </a:r>
+            <a:r>
+              <a:rPr lang="en-US" sz="1200" dirty="0">
+                <a:solidFill>
+                  <a:srgbClr val="FF0000"/>
+                </a:solidFill>
+              </a:rPr>
+              <a:t> quartile to maximum for the white community had a 98.87% increase</a:t>
+            </a:r>
+          </a:p>
+          <a:p>
+            <a:pPr marL="171450" indent="-171450">
+              <a:buFont typeface="Arial" panose="020B0604020202020204" pitchFamily="34" charset="0"/>
+              <a:buChar char="•"/>
+            </a:pPr>
+            <a:r>
+              <a:rPr lang="en-US" sz="1200" dirty="0">
+                <a:solidFill>
+                  <a:srgbClr val="FF0000"/>
+                </a:solidFill>
+              </a:rPr>
+              <a:t>P Value = .95877 which is not significant and resulted in a Null Hypothesis</a:t>
+            </a:r>
+          </a:p>
+        </p:txBody>
+      </p:sp>
       <p:pic>
         <p:nvPicPr>
-          <p:cNvPr id="8" name="Picture 7">
+          <p:cNvPr id="5" name="Picture 4">
             <a:extLst>
               <a:ext uri="{FF2B5EF4-FFF2-40B4-BE49-F238E27FC236}">
-                <a16:creationId xmlns:a16="http://schemas.microsoft.com/office/drawing/2014/main" id="{5A5DD584-6CEE-4184-8F14-058FF59806EB}"/>
+                <a16:creationId xmlns:a16="http://schemas.microsoft.com/office/drawing/2014/main" id="{94A870DF-8600-45D7-8DBA-0D59A2D6C9A4}"/>
               </a:ext>
             </a:extLst>
           </p:cNvPr>
@@ -5373,117 +5378,14 @@
         </p:blipFill>
         <p:spPr>
           <a:xfrm>
-            <a:off x="6692492" y="4419599"/>
-            <a:ext cx="2419350" cy="2438400"/>
+            <a:off x="8038" y="3276600"/>
+            <a:ext cx="6087961" cy="3581399"/>
           </a:xfrm>
           <a:prstGeom prst="rect">
             <a:avLst/>
           </a:prstGeom>
         </p:spPr>
       </p:pic>
-      <p:sp>
-        <p:nvSpPr>
-          <p:cNvPr id="9" name="TextBox 8">
-            <a:extLst>
-              <a:ext uri="{FF2B5EF4-FFF2-40B4-BE49-F238E27FC236}">
-                <a16:creationId xmlns:a16="http://schemas.microsoft.com/office/drawing/2014/main" id="{73794508-4138-4CF9-BDB0-26DDC78C1F9A}"/>
-              </a:ext>
-            </a:extLst>
-          </p:cNvPr>
-          <p:cNvSpPr txBox="1"/>
-          <p:nvPr/>
-        </p:nvSpPr>
-        <p:spPr>
-          <a:xfrm>
-            <a:off x="457200" y="1905000"/>
-            <a:ext cx="5063502" cy="646331"/>
-          </a:xfrm>
-          <a:prstGeom prst="rect">
-            <a:avLst/>
-          </a:prstGeom>
-          <a:noFill/>
-        </p:spPr>
-        <p:txBody>
-          <a:bodyPr wrap="none" rtlCol="0">
-            <a:spAutoFit/>
-          </a:bodyPr>
-          <a:lstStyle/>
-          <a:p>
-            <a:pPr marL="171450" indent="-171450">
-              <a:buFont typeface="Arial" panose="020B0604020202020204" pitchFamily="34" charset="0"/>
-              <a:buChar char="•"/>
-            </a:pPr>
-            <a:r>
-              <a:rPr lang="en-US" sz="1200" dirty="0">
-                <a:solidFill>
-                  <a:srgbClr val="FF0000"/>
-                </a:solidFill>
-              </a:rPr>
-              <a:t>1</a:t>
-            </a:r>
-            <a:r>
-              <a:rPr lang="en-US" sz="1200" baseline="30000" dirty="0">
-                <a:solidFill>
-                  <a:srgbClr val="FF0000"/>
-                </a:solidFill>
-              </a:rPr>
-              <a:t>st</a:t>
-            </a:r>
-            <a:r>
-              <a:rPr lang="en-US" sz="1200" dirty="0">
-                <a:solidFill>
-                  <a:srgbClr val="FF0000"/>
-                </a:solidFill>
-              </a:rPr>
-              <a:t> quartile and minimum was not displayed because median was zero</a:t>
-            </a:r>
-          </a:p>
-          <a:p>
-            <a:pPr marL="171450" indent="-171450">
-              <a:buFont typeface="Arial" panose="020B0604020202020204" pitchFamily="34" charset="0"/>
-              <a:buChar char="•"/>
-            </a:pPr>
-            <a:r>
-              <a:rPr lang="en-US" sz="1200" dirty="0">
-                <a:solidFill>
-                  <a:srgbClr val="FF0000"/>
-                </a:solidFill>
-              </a:rPr>
-              <a:t>4</a:t>
-            </a:r>
-            <a:r>
-              <a:rPr lang="en-US" sz="1200" baseline="30000" dirty="0">
-                <a:solidFill>
-                  <a:srgbClr val="FF0000"/>
-                </a:solidFill>
-              </a:rPr>
-              <a:t>th</a:t>
-            </a:r>
-            <a:r>
-              <a:rPr lang="en-US" sz="1200" dirty="0">
-                <a:solidFill>
-                  <a:srgbClr val="FF0000"/>
-                </a:solidFill>
-              </a:rPr>
-              <a:t> quartile to maximum for the white community had a 98.87% increase</a:t>
-            </a:r>
-          </a:p>
-          <a:p>
-            <a:pPr marL="171450" indent="-171450">
-              <a:buFont typeface="Arial" panose="020B0604020202020204" pitchFamily="34" charset="0"/>
-              <a:buChar char="•"/>
-            </a:pPr>
-            <a:r>
-              <a:rPr lang="en-US" sz="1200" dirty="0">
-                <a:solidFill>
-                  <a:srgbClr val="FF0000"/>
-                </a:solidFill>
-              </a:rPr>
-              <a:t>P Value = .95877 which is not significant and resulted in a Null Hypothesis</a:t>
-            </a:r>
-          </a:p>
-        </p:txBody>
-      </p:sp>
     </p:spTree>
     <p:extLst>
       <p:ext uri="{BB962C8B-B14F-4D97-AF65-F5344CB8AC3E}">
@@ -5552,7 +5454,7 @@
         <p:spPr>
           <a:xfrm>
             <a:off x="838200" y="2438400"/>
-            <a:ext cx="3802644" cy="1107996"/>
+            <a:ext cx="3842719" cy="1107996"/>
           </a:xfrm>
           <a:prstGeom prst="rect">
             <a:avLst/>
@@ -5629,7 +5531,7 @@
                   <a:srgbClr val="FF0000"/>
                 </a:solidFill>
               </a:rPr>
-              <a:t>which is significant</a:t>
+              <a:t>which is not significant</a:t>
             </a:r>
           </a:p>
           <a:p>
@@ -5639,56 +5541,11 @@
                   <a:srgbClr val="FF0000"/>
                 </a:solidFill>
               </a:rPr>
-              <a:t>and disproves the </a:t>
-            </a:r>
-            <a:r>
-              <a:rPr lang="en-US" sz="1200">
-                <a:solidFill>
-                  <a:srgbClr val="FF0000"/>
-                </a:solidFill>
-              </a:rPr>
-              <a:t>null hypothesis </a:t>
-            </a:r>
-            <a:endParaRPr lang="en-US" sz="1200" dirty="0">
-              <a:solidFill>
-                <a:srgbClr val="FF0000"/>
-              </a:solidFill>
-            </a:endParaRPr>
-          </a:p>
-        </p:txBody>
-      </p:sp>
-      <p:pic>
-        <p:nvPicPr>
-          <p:cNvPr id="10" name="Content Placeholder 9">
-            <a:extLst>
-              <a:ext uri="{FF2B5EF4-FFF2-40B4-BE49-F238E27FC236}">
-                <a16:creationId xmlns:a16="http://schemas.microsoft.com/office/drawing/2014/main" id="{41A03EA7-35D9-44CF-BDB8-FDB323CF8401}"/>
-              </a:ext>
-            </a:extLst>
-          </p:cNvPr>
-          <p:cNvPicPr>
-            <a:picLocks noGrp="1" noChangeAspect="1"/>
-          </p:cNvPicPr>
-          <p:nvPr>
-            <p:ph idx="1"/>
-          </p:nvPr>
-        </p:nvPicPr>
-        <p:blipFill>
-          <a:blip r:embed="rId2"/>
-          <a:stretch>
-            <a:fillRect/>
-          </a:stretch>
-        </p:blipFill>
-        <p:spPr>
-          <a:xfrm>
-            <a:off x="0" y="4295775"/>
-            <a:ext cx="4572000" cy="2562225"/>
-          </a:xfrm>
-          <a:prstGeom prst="rect">
-            <a:avLst/>
-          </a:prstGeom>
-        </p:spPr>
-      </p:pic>
+              <a:t>and disproves the hypothesis </a:t>
+            </a:r>
+          </a:p>
+        </p:txBody>
+      </p:sp>
       <p:pic>
         <p:nvPicPr>
           <p:cNvPr id="13" name="Picture 12">
@@ -5704,7 +5561,7 @@
           <p:nvPr/>
         </p:nvPicPr>
         <p:blipFill>
-          <a:blip r:embed="rId3"/>
+          <a:blip r:embed="rId2"/>
           <a:stretch>
             <a:fillRect/>
           </a:stretch>
@@ -5734,7 +5591,7 @@
           <p:nvPr/>
         </p:nvPicPr>
         <p:blipFill>
-          <a:blip r:embed="rId4"/>
+          <a:blip r:embed="rId3"/>
           <a:stretch>
             <a:fillRect/>
           </a:stretch>
@@ -5743,6 +5600,36 @@
           <a:xfrm>
             <a:off x="4724400" y="4295775"/>
             <a:ext cx="4419600" cy="2562225"/>
+          </a:xfrm>
+          <a:prstGeom prst="rect">
+            <a:avLst/>
+          </a:prstGeom>
+        </p:spPr>
+      </p:pic>
+      <p:pic>
+        <p:nvPicPr>
+          <p:cNvPr id="5" name="Picture 4">
+            <a:extLst>
+              <a:ext uri="{FF2B5EF4-FFF2-40B4-BE49-F238E27FC236}">
+                <a16:creationId xmlns:a16="http://schemas.microsoft.com/office/drawing/2014/main" id="{CFD25F6C-C3BB-4DA0-9F4F-13C6C9B00763}"/>
+              </a:ext>
+            </a:extLst>
+          </p:cNvPr>
+          <p:cNvPicPr>
+            <a:picLocks noChangeAspect="1"/>
+          </p:cNvPicPr>
+          <p:nvPr/>
+        </p:nvPicPr>
+        <p:blipFill>
+          <a:blip r:embed="rId4"/>
+          <a:stretch>
+            <a:fillRect/>
+          </a:stretch>
+        </p:blipFill>
+        <p:spPr>
+          <a:xfrm>
+            <a:off x="0" y="4086225"/>
+            <a:ext cx="4067175" cy="2771775"/>
           </a:xfrm>
           <a:prstGeom prst="rect">
             <a:avLst/>

</xml_diff>